<commit_message>
[Problem] Plot Time and Frequency Domain Signals to identify same and different user/action
[Measure] Plotted various graphs to identify similarity/dissimilarity between user/action
1. Time Domain Complete Signal Plot
2. Time Domain 100 Sample Signal Plot
3. Frequency Domain Complete Signal Plot
4. Frequency Domain 100 Sample Plot
</commit_message>
<xml_diff>
--- a/MusicKeyboard/Phase2/Plot_CMI_EMG_Data1.pptx
+++ b/MusicKeyboard/Phase2/Plot_CMI_EMG_Data1.pptx
@@ -4,6 +4,9 @@
   <p:sldMasterIdLst>
     <p:sldMasterId id="2147483756" r:id="rId1"/>
   </p:sldMasterIdLst>
+  <p:notesMasterIdLst>
+    <p:notesMasterId r:id="rId35"/>
+  </p:notesMasterIdLst>
   <p:sldIdLst>
     <p:sldId id="256" r:id="rId2"/>
     <p:sldId id="278" r:id="rId3"/>
@@ -26,6 +29,18 @@
     <p:sldId id="275" r:id="rId20"/>
     <p:sldId id="276" r:id="rId21"/>
     <p:sldId id="277" r:id="rId22"/>
+    <p:sldId id="294" r:id="rId23"/>
+    <p:sldId id="295" r:id="rId24"/>
+    <p:sldId id="280" r:id="rId25"/>
+    <p:sldId id="285" r:id="rId26"/>
+    <p:sldId id="290" r:id="rId27"/>
+    <p:sldId id="291" r:id="rId28"/>
+    <p:sldId id="292" r:id="rId29"/>
+    <p:sldId id="293" r:id="rId30"/>
+    <p:sldId id="286" r:id="rId31"/>
+    <p:sldId id="287" r:id="rId32"/>
+    <p:sldId id="288" r:id="rId33"/>
+    <p:sldId id="289" r:id="rId34"/>
   </p:sldIdLst>
   <p:sldSz cx="12192000" cy="6858000"/>
   <p:notesSz cx="6858000" cy="9144000"/>
@@ -132,6 +147,440 @@
 </p:presentation>
 </file>
 
+<file path=ppt/notesMasters/notesMaster1.xml><?xml version="1.0" encoding="utf-8"?>
+<p:notesMaster xmlns:a="http://schemas.openxmlformats.org/drawingml/2006/main" xmlns:r="http://schemas.openxmlformats.org/officeDocument/2006/relationships" xmlns:p="http://schemas.openxmlformats.org/presentationml/2006/main">
+  <p:cSld>
+    <p:bg>
+      <p:bgRef idx="1001">
+        <a:schemeClr val="bg1"/>
+      </p:bgRef>
+    </p:bg>
+    <p:spTree>
+      <p:nvGrpSpPr>
+        <p:cNvPr id="1" name=""/>
+        <p:cNvGrpSpPr/>
+        <p:nvPr/>
+      </p:nvGrpSpPr>
+      <p:grpSpPr>
+        <a:xfrm>
+          <a:off x="0" y="0"/>
+          <a:ext cx="0" cy="0"/>
+          <a:chOff x="0" y="0"/>
+          <a:chExt cx="0" cy="0"/>
+        </a:xfrm>
+      </p:grpSpPr>
+      <p:sp>
+        <p:nvSpPr>
+          <p:cNvPr id="2" name="Header Placeholder 1"/>
+          <p:cNvSpPr>
+            <a:spLocks noGrp="1"/>
+          </p:cNvSpPr>
+          <p:nvPr>
+            <p:ph type="hdr" sz="quarter"/>
+          </p:nvPr>
+        </p:nvSpPr>
+        <p:spPr>
+          <a:xfrm>
+            <a:off x="0" y="0"/>
+            <a:ext cx="2971800" cy="458788"/>
+          </a:xfrm>
+          <a:prstGeom prst="rect">
+            <a:avLst/>
+          </a:prstGeom>
+        </p:spPr>
+        <p:txBody>
+          <a:bodyPr vert="horz" lIns="91440" tIns="45720" rIns="91440" bIns="45720" rtlCol="0"/>
+          <a:lstStyle>
+            <a:lvl1pPr algn="l">
+              <a:defRPr sz="1200"/>
+            </a:lvl1pPr>
+          </a:lstStyle>
+          <a:p>
+            <a:endParaRPr lang="en-IN"/>
+          </a:p>
+        </p:txBody>
+      </p:sp>
+      <p:sp>
+        <p:nvSpPr>
+          <p:cNvPr id="3" name="Date Placeholder 2"/>
+          <p:cNvSpPr>
+            <a:spLocks noGrp="1"/>
+          </p:cNvSpPr>
+          <p:nvPr>
+            <p:ph type="dt" idx="1"/>
+          </p:nvPr>
+        </p:nvSpPr>
+        <p:spPr>
+          <a:xfrm>
+            <a:off x="3884613" y="0"/>
+            <a:ext cx="2971800" cy="458788"/>
+          </a:xfrm>
+          <a:prstGeom prst="rect">
+            <a:avLst/>
+          </a:prstGeom>
+        </p:spPr>
+        <p:txBody>
+          <a:bodyPr vert="horz" lIns="91440" tIns="45720" rIns="91440" bIns="45720" rtlCol="0"/>
+          <a:lstStyle>
+            <a:lvl1pPr algn="r">
+              <a:defRPr sz="1200"/>
+            </a:lvl1pPr>
+          </a:lstStyle>
+          <a:p>
+            <a:fld id="{656FD8FB-EDE9-4D9C-9FDD-B6F3F03E4F9E}" type="datetimeFigureOut">
+              <a:rPr lang="en-IN" smtClean="0"/>
+              <a:t>14-06-2019</a:t>
+            </a:fld>
+            <a:endParaRPr lang="en-IN"/>
+          </a:p>
+        </p:txBody>
+      </p:sp>
+      <p:sp>
+        <p:nvSpPr>
+          <p:cNvPr id="4" name="Slide Image Placeholder 3"/>
+          <p:cNvSpPr>
+            <a:spLocks noGrp="1" noRot="1" noChangeAspect="1"/>
+          </p:cNvSpPr>
+          <p:nvPr>
+            <p:ph type="sldImg" idx="2"/>
+          </p:nvPr>
+        </p:nvSpPr>
+        <p:spPr>
+          <a:xfrm>
+            <a:off x="685800" y="1143000"/>
+            <a:ext cx="5486400" cy="3086100"/>
+          </a:xfrm>
+          <a:prstGeom prst="rect">
+            <a:avLst/>
+          </a:prstGeom>
+          <a:noFill/>
+          <a:ln w="12700">
+            <a:solidFill>
+              <a:prstClr val="black"/>
+            </a:solidFill>
+          </a:ln>
+        </p:spPr>
+        <p:txBody>
+          <a:bodyPr vert="horz" lIns="91440" tIns="45720" rIns="91440" bIns="45720" rtlCol="0" anchor="ctr"/>
+          <a:lstStyle/>
+          <a:p>
+            <a:endParaRPr lang="en-IN"/>
+          </a:p>
+        </p:txBody>
+      </p:sp>
+      <p:sp>
+        <p:nvSpPr>
+          <p:cNvPr id="5" name="Notes Placeholder 4"/>
+          <p:cNvSpPr>
+            <a:spLocks noGrp="1"/>
+          </p:cNvSpPr>
+          <p:nvPr>
+            <p:ph type="body" sz="quarter" idx="3"/>
+          </p:nvPr>
+        </p:nvSpPr>
+        <p:spPr>
+          <a:xfrm>
+            <a:off x="685800" y="4400550"/>
+            <a:ext cx="5486400" cy="3600450"/>
+          </a:xfrm>
+          <a:prstGeom prst="rect">
+            <a:avLst/>
+          </a:prstGeom>
+        </p:spPr>
+        <p:txBody>
+          <a:bodyPr vert="horz" lIns="91440" tIns="45720" rIns="91440" bIns="45720" rtlCol="0"/>
+          <a:lstStyle/>
+          <a:p>
+            <a:pPr lvl="0"/>
+            <a:r>
+              <a:rPr lang="en-US"/>
+              <a:t>Edit Master text styles</a:t>
+            </a:r>
+          </a:p>
+          <a:p>
+            <a:pPr lvl="1"/>
+            <a:r>
+              <a:rPr lang="en-US"/>
+              <a:t>Second level</a:t>
+            </a:r>
+          </a:p>
+          <a:p>
+            <a:pPr lvl="2"/>
+            <a:r>
+              <a:rPr lang="en-US"/>
+              <a:t>Third level</a:t>
+            </a:r>
+          </a:p>
+          <a:p>
+            <a:pPr lvl="3"/>
+            <a:r>
+              <a:rPr lang="en-US"/>
+              <a:t>Fourth level</a:t>
+            </a:r>
+          </a:p>
+          <a:p>
+            <a:pPr lvl="4"/>
+            <a:r>
+              <a:rPr lang="en-US"/>
+              <a:t>Fifth level</a:t>
+            </a:r>
+            <a:endParaRPr lang="en-IN"/>
+          </a:p>
+        </p:txBody>
+      </p:sp>
+      <p:sp>
+        <p:nvSpPr>
+          <p:cNvPr id="6" name="Footer Placeholder 5"/>
+          <p:cNvSpPr>
+            <a:spLocks noGrp="1"/>
+          </p:cNvSpPr>
+          <p:nvPr>
+            <p:ph type="ftr" sz="quarter" idx="4"/>
+          </p:nvPr>
+        </p:nvSpPr>
+        <p:spPr>
+          <a:xfrm>
+            <a:off x="0" y="8685213"/>
+            <a:ext cx="2971800" cy="458787"/>
+          </a:xfrm>
+          <a:prstGeom prst="rect">
+            <a:avLst/>
+          </a:prstGeom>
+        </p:spPr>
+        <p:txBody>
+          <a:bodyPr vert="horz" lIns="91440" tIns="45720" rIns="91440" bIns="45720" rtlCol="0" anchor="b"/>
+          <a:lstStyle>
+            <a:lvl1pPr algn="l">
+              <a:defRPr sz="1200"/>
+            </a:lvl1pPr>
+          </a:lstStyle>
+          <a:p>
+            <a:endParaRPr lang="en-IN"/>
+          </a:p>
+        </p:txBody>
+      </p:sp>
+      <p:sp>
+        <p:nvSpPr>
+          <p:cNvPr id="7" name="Slide Number Placeholder 6"/>
+          <p:cNvSpPr>
+            <a:spLocks noGrp="1"/>
+          </p:cNvSpPr>
+          <p:nvPr>
+            <p:ph type="sldNum" sz="quarter" idx="5"/>
+          </p:nvPr>
+        </p:nvSpPr>
+        <p:spPr>
+          <a:xfrm>
+            <a:off x="3884613" y="8685213"/>
+            <a:ext cx="2971800" cy="458787"/>
+          </a:xfrm>
+          <a:prstGeom prst="rect">
+            <a:avLst/>
+          </a:prstGeom>
+        </p:spPr>
+        <p:txBody>
+          <a:bodyPr vert="horz" lIns="91440" tIns="45720" rIns="91440" bIns="45720" rtlCol="0" anchor="b"/>
+          <a:lstStyle>
+            <a:lvl1pPr algn="r">
+              <a:defRPr sz="1200"/>
+            </a:lvl1pPr>
+          </a:lstStyle>
+          <a:p>
+            <a:fld id="{C9CF3ADA-6C9B-43BA-B93D-79CD44A2CD8F}" type="slidenum">
+              <a:rPr lang="en-IN" smtClean="0"/>
+              <a:t>‹#›</a:t>
+            </a:fld>
+            <a:endParaRPr lang="en-IN"/>
+          </a:p>
+        </p:txBody>
+      </p:sp>
+    </p:spTree>
+    <p:extLst>
+      <p:ext uri="{BB962C8B-B14F-4D97-AF65-F5344CB8AC3E}">
+        <p14:creationId xmlns:p14="http://schemas.microsoft.com/office/powerpoint/2010/main" val="702259398"/>
+      </p:ext>
+    </p:extLst>
+  </p:cSld>
+  <p:clrMap bg1="lt1" tx1="dk1" bg2="lt2" tx2="dk2" accent1="accent1" accent2="accent2" accent3="accent3" accent4="accent4" accent5="accent5" accent6="accent6" hlink="hlink" folHlink="folHlink"/>
+  <p:notesStyle>
+    <a:lvl1pPr marL="0" algn="l" defTabSz="914400" rtl="0" eaLnBrk="1" latinLnBrk="0" hangingPunct="1">
+      <a:defRPr sz="1200" kern="1200">
+        <a:solidFill>
+          <a:schemeClr val="tx1"/>
+        </a:solidFill>
+        <a:latin typeface="+mn-lt"/>
+        <a:ea typeface="+mn-ea"/>
+        <a:cs typeface="+mn-cs"/>
+      </a:defRPr>
+    </a:lvl1pPr>
+    <a:lvl2pPr marL="457200" algn="l" defTabSz="914400" rtl="0" eaLnBrk="1" latinLnBrk="0" hangingPunct="1">
+      <a:defRPr sz="1200" kern="1200">
+        <a:solidFill>
+          <a:schemeClr val="tx1"/>
+        </a:solidFill>
+        <a:latin typeface="+mn-lt"/>
+        <a:ea typeface="+mn-ea"/>
+        <a:cs typeface="+mn-cs"/>
+      </a:defRPr>
+    </a:lvl2pPr>
+    <a:lvl3pPr marL="914400" algn="l" defTabSz="914400" rtl="0" eaLnBrk="1" latinLnBrk="0" hangingPunct="1">
+      <a:defRPr sz="1200" kern="1200">
+        <a:solidFill>
+          <a:schemeClr val="tx1"/>
+        </a:solidFill>
+        <a:latin typeface="+mn-lt"/>
+        <a:ea typeface="+mn-ea"/>
+        <a:cs typeface="+mn-cs"/>
+      </a:defRPr>
+    </a:lvl3pPr>
+    <a:lvl4pPr marL="1371600" algn="l" defTabSz="914400" rtl="0" eaLnBrk="1" latinLnBrk="0" hangingPunct="1">
+      <a:defRPr sz="1200" kern="1200">
+        <a:solidFill>
+          <a:schemeClr val="tx1"/>
+        </a:solidFill>
+        <a:latin typeface="+mn-lt"/>
+        <a:ea typeface="+mn-ea"/>
+        <a:cs typeface="+mn-cs"/>
+      </a:defRPr>
+    </a:lvl4pPr>
+    <a:lvl5pPr marL="1828800" algn="l" defTabSz="914400" rtl="0" eaLnBrk="1" latinLnBrk="0" hangingPunct="1">
+      <a:defRPr sz="1200" kern="1200">
+        <a:solidFill>
+          <a:schemeClr val="tx1"/>
+        </a:solidFill>
+        <a:latin typeface="+mn-lt"/>
+        <a:ea typeface="+mn-ea"/>
+        <a:cs typeface="+mn-cs"/>
+      </a:defRPr>
+    </a:lvl5pPr>
+    <a:lvl6pPr marL="2286000" algn="l" defTabSz="914400" rtl="0" eaLnBrk="1" latinLnBrk="0" hangingPunct="1">
+      <a:defRPr sz="1200" kern="1200">
+        <a:solidFill>
+          <a:schemeClr val="tx1"/>
+        </a:solidFill>
+        <a:latin typeface="+mn-lt"/>
+        <a:ea typeface="+mn-ea"/>
+        <a:cs typeface="+mn-cs"/>
+      </a:defRPr>
+    </a:lvl6pPr>
+    <a:lvl7pPr marL="2743200" algn="l" defTabSz="914400" rtl="0" eaLnBrk="1" latinLnBrk="0" hangingPunct="1">
+      <a:defRPr sz="1200" kern="1200">
+        <a:solidFill>
+          <a:schemeClr val="tx1"/>
+        </a:solidFill>
+        <a:latin typeface="+mn-lt"/>
+        <a:ea typeface="+mn-ea"/>
+        <a:cs typeface="+mn-cs"/>
+      </a:defRPr>
+    </a:lvl7pPr>
+    <a:lvl8pPr marL="3200400" algn="l" defTabSz="914400" rtl="0" eaLnBrk="1" latinLnBrk="0" hangingPunct="1">
+      <a:defRPr sz="1200" kern="1200">
+        <a:solidFill>
+          <a:schemeClr val="tx1"/>
+        </a:solidFill>
+        <a:latin typeface="+mn-lt"/>
+        <a:ea typeface="+mn-ea"/>
+        <a:cs typeface="+mn-cs"/>
+      </a:defRPr>
+    </a:lvl8pPr>
+    <a:lvl9pPr marL="3657600" algn="l" defTabSz="914400" rtl="0" eaLnBrk="1" latinLnBrk="0" hangingPunct="1">
+      <a:defRPr sz="1200" kern="1200">
+        <a:solidFill>
+          <a:schemeClr val="tx1"/>
+        </a:solidFill>
+        <a:latin typeface="+mn-lt"/>
+        <a:ea typeface="+mn-ea"/>
+        <a:cs typeface="+mn-cs"/>
+      </a:defRPr>
+    </a:lvl9pPr>
+  </p:notesStyle>
+</p:notesMaster>
+</file>
+
+<file path=ppt/notesSlides/notesSlide1.xml><?xml version="1.0" encoding="utf-8"?>
+<p:notes xmlns:a="http://schemas.openxmlformats.org/drawingml/2006/main" xmlns:r="http://schemas.openxmlformats.org/officeDocument/2006/relationships" xmlns:p="http://schemas.openxmlformats.org/presentationml/2006/main">
+  <p:cSld>
+    <p:spTree>
+      <p:nvGrpSpPr>
+        <p:cNvPr id="1" name=""/>
+        <p:cNvGrpSpPr/>
+        <p:nvPr/>
+      </p:nvGrpSpPr>
+      <p:grpSpPr>
+        <a:xfrm>
+          <a:off x="0" y="0"/>
+          <a:ext cx="0" cy="0"/>
+          <a:chOff x="0" y="0"/>
+          <a:chExt cx="0" cy="0"/>
+        </a:xfrm>
+      </p:grpSpPr>
+      <p:sp>
+        <p:nvSpPr>
+          <p:cNvPr id="2" name="Slide Image Placeholder 1"/>
+          <p:cNvSpPr>
+            <a:spLocks noGrp="1" noRot="1" noChangeAspect="1"/>
+          </p:cNvSpPr>
+          <p:nvPr>
+            <p:ph type="sldImg"/>
+          </p:nvPr>
+        </p:nvSpPr>
+        <p:spPr/>
+      </p:sp>
+      <p:sp>
+        <p:nvSpPr>
+          <p:cNvPr id="3" name="Notes Placeholder 2"/>
+          <p:cNvSpPr>
+            <a:spLocks noGrp="1"/>
+          </p:cNvSpPr>
+          <p:nvPr>
+            <p:ph type="body" idx="1"/>
+          </p:nvPr>
+        </p:nvSpPr>
+        <p:spPr/>
+        <p:txBody>
+          <a:bodyPr/>
+          <a:lstStyle/>
+          <a:p>
+            <a:endParaRPr lang="en-IN" dirty="0"/>
+          </a:p>
+        </p:txBody>
+      </p:sp>
+      <p:sp>
+        <p:nvSpPr>
+          <p:cNvPr id="4" name="Slide Number Placeholder 3"/>
+          <p:cNvSpPr>
+            <a:spLocks noGrp="1"/>
+          </p:cNvSpPr>
+          <p:nvPr>
+            <p:ph type="sldNum" sz="quarter" idx="5"/>
+          </p:nvPr>
+        </p:nvSpPr>
+        <p:spPr/>
+        <p:txBody>
+          <a:bodyPr/>
+          <a:lstStyle/>
+          <a:p>
+            <a:fld id="{C9CF3ADA-6C9B-43BA-B93D-79CD44A2CD8F}" type="slidenum">
+              <a:rPr lang="en-IN" smtClean="0"/>
+              <a:t>24</a:t>
+            </a:fld>
+            <a:endParaRPr lang="en-IN"/>
+          </a:p>
+        </p:txBody>
+      </p:sp>
+    </p:spTree>
+    <p:extLst>
+      <p:ext uri="{BB962C8B-B14F-4D97-AF65-F5344CB8AC3E}">
+        <p14:creationId xmlns:p14="http://schemas.microsoft.com/office/powerpoint/2010/main" val="1080351322"/>
+      </p:ext>
+    </p:extLst>
+  </p:cSld>
+  <p:clrMapOvr>
+    <a:masterClrMapping/>
+  </p:clrMapOvr>
+</p:notes>
+</file>
+
 <file path=ppt/slideLayouts/slideLayout1.xml><?xml version="1.0" encoding="utf-8"?>
 <p:sldLayout xmlns:a="http://schemas.openxmlformats.org/drawingml/2006/main" xmlns:r="http://schemas.openxmlformats.org/officeDocument/2006/relationships" xmlns:p="http://schemas.openxmlformats.org/presentationml/2006/main" showMasterSp="0" type="title" preserve="1">
   <p:cSld name="Title Slide">
@@ -358,7 +807,7 @@
           <a:p>
             <a:fld id="{6470B363-B0B8-4922-819D-62C5D2D8B3F1}" type="datetimeFigureOut">
               <a:rPr lang="en-IN" smtClean="0"/>
-              <a:t>10-06-2019</a:t>
+              <a:t>14-06-2019</a:t>
             </a:fld>
             <a:endParaRPr lang="en-IN"/>
           </a:p>
@@ -566,7 +1015,7 @@
           <a:p>
             <a:fld id="{6470B363-B0B8-4922-819D-62C5D2D8B3F1}" type="datetimeFigureOut">
               <a:rPr lang="en-IN" smtClean="0"/>
-              <a:t>10-06-2019</a:t>
+              <a:t>14-06-2019</a:t>
             </a:fld>
             <a:endParaRPr lang="en-IN"/>
           </a:p>
@@ -822,7 +1271,7 @@
           <a:p>
             <a:fld id="{6470B363-B0B8-4922-819D-62C5D2D8B3F1}" type="datetimeFigureOut">
               <a:rPr lang="en-IN" smtClean="0"/>
-              <a:t>10-06-2019</a:t>
+              <a:t>14-06-2019</a:t>
             </a:fld>
             <a:endParaRPr lang="en-IN"/>
           </a:p>
@@ -996,7 +1445,7 @@
           <a:p>
             <a:fld id="{6470B363-B0B8-4922-819D-62C5D2D8B3F1}" type="datetimeFigureOut">
               <a:rPr lang="en-IN" smtClean="0"/>
-              <a:t>10-06-2019</a:t>
+              <a:t>14-06-2019</a:t>
             </a:fld>
             <a:endParaRPr lang="en-IN"/>
           </a:p>
@@ -1339,7 +1788,7 @@
           <a:p>
             <a:fld id="{6470B363-B0B8-4922-819D-62C5D2D8B3F1}" type="datetimeFigureOut">
               <a:rPr lang="en-IN" smtClean="0"/>
-              <a:t>10-06-2019</a:t>
+              <a:t>14-06-2019</a:t>
             </a:fld>
             <a:endParaRPr lang="en-IN"/>
           </a:p>
@@ -1614,7 +2063,7 @@
           <a:p>
             <a:fld id="{6470B363-B0B8-4922-819D-62C5D2D8B3F1}" type="datetimeFigureOut">
               <a:rPr lang="en-IN" smtClean="0"/>
-              <a:t>10-06-2019</a:t>
+              <a:t>14-06-2019</a:t>
             </a:fld>
             <a:endParaRPr lang="en-IN"/>
           </a:p>
@@ -1993,7 +2442,7 @@
           <a:p>
             <a:fld id="{6470B363-B0B8-4922-819D-62C5D2D8B3F1}" type="datetimeFigureOut">
               <a:rPr lang="en-IN" smtClean="0"/>
-              <a:t>10-06-2019</a:t>
+              <a:t>14-06-2019</a:t>
             </a:fld>
             <a:endParaRPr lang="en-IN"/>
           </a:p>
@@ -2111,7 +2560,7 @@
           <a:p>
             <a:fld id="{6470B363-B0B8-4922-819D-62C5D2D8B3F1}" type="datetimeFigureOut">
               <a:rPr lang="en-IN" smtClean="0"/>
-              <a:t>10-06-2019</a:t>
+              <a:t>14-06-2019</a:t>
             </a:fld>
             <a:endParaRPr lang="en-IN"/>
           </a:p>
@@ -2282,7 +2731,7 @@
           <a:p>
             <a:fld id="{6470B363-B0B8-4922-819D-62C5D2D8B3F1}" type="datetimeFigureOut">
               <a:rPr lang="en-IN" smtClean="0"/>
-              <a:t>10-06-2019</a:t>
+              <a:t>14-06-2019</a:t>
             </a:fld>
             <a:endParaRPr lang="en-IN"/>
           </a:p>
@@ -2636,7 +3085,7 @@
           <a:p>
             <a:fld id="{6470B363-B0B8-4922-819D-62C5D2D8B3F1}" type="datetimeFigureOut">
               <a:rPr lang="en-IN" smtClean="0"/>
-              <a:t>10-06-2019</a:t>
+              <a:t>14-06-2019</a:t>
             </a:fld>
             <a:endParaRPr lang="en-IN"/>
           </a:p>
@@ -3018,7 +3467,7 @@
           <a:p>
             <a:fld id="{6470B363-B0B8-4922-819D-62C5D2D8B3F1}" type="datetimeFigureOut">
               <a:rPr lang="en-IN" smtClean="0"/>
-              <a:t>10-06-2019</a:t>
+              <a:t>14-06-2019</a:t>
             </a:fld>
             <a:endParaRPr lang="en-IN"/>
           </a:p>
@@ -3305,7 +3754,7 @@
           <a:p>
             <a:fld id="{6470B363-B0B8-4922-819D-62C5D2D8B3F1}" type="datetimeFigureOut">
               <a:rPr lang="en-IN" smtClean="0"/>
-              <a:t>10-06-2019</a:t>
+              <a:t>14-06-2019</a:t>
             </a:fld>
             <a:endParaRPr lang="en-IN"/>
           </a:p>
@@ -5199,8 +5648,8 @@
         </p:blipFill>
         <p:spPr>
           <a:xfrm>
-            <a:off x="71966" y="23578"/>
-            <a:ext cx="4052359" cy="2583379"/>
+            <a:off x="71966" y="4917"/>
+            <a:ext cx="5442426" cy="3469547"/>
           </a:xfrm>
           <a:prstGeom prst="rect">
             <a:avLst/>
@@ -5235,8 +5684,8 @@
         </p:blipFill>
         <p:spPr>
           <a:xfrm>
-            <a:off x="0" y="3689763"/>
-            <a:ext cx="4124325" cy="2629256"/>
+            <a:off x="1" y="3704254"/>
+            <a:ext cx="4160140" cy="2652088"/>
           </a:xfrm>
           <a:prstGeom prst="rect">
             <a:avLst/>
@@ -6865,6 +7314,1478 @@
 </p:sld>
 </file>
 
+<file path=ppt/slides/slide22.xml><?xml version="1.0" encoding="utf-8"?>
+<p:sld xmlns:a="http://schemas.openxmlformats.org/drawingml/2006/main" xmlns:r="http://schemas.openxmlformats.org/officeDocument/2006/relationships" xmlns:p="http://schemas.openxmlformats.org/presentationml/2006/main">
+  <p:cSld>
+    <p:spTree>
+      <p:nvGrpSpPr>
+        <p:cNvPr id="1" name=""/>
+        <p:cNvGrpSpPr/>
+        <p:nvPr/>
+      </p:nvGrpSpPr>
+      <p:grpSpPr>
+        <a:xfrm>
+          <a:off x="0" y="0"/>
+          <a:ext cx="0" cy="0"/>
+          <a:chOff x="0" y="0"/>
+          <a:chExt cx="0" cy="0"/>
+        </a:xfrm>
+      </p:grpSpPr>
+      <p:sp>
+        <p:nvSpPr>
+          <p:cNvPr id="5" name="TextBox 4">
+            <a:extLst>
+              <a:ext uri="{FF2B5EF4-FFF2-40B4-BE49-F238E27FC236}">
+                <a16:creationId xmlns:a16="http://schemas.microsoft.com/office/drawing/2014/main" id="{5E17846F-F836-4707-BD98-4FAE5FC071FE}"/>
+              </a:ext>
+            </a:extLst>
+          </p:cNvPr>
+          <p:cNvSpPr txBox="1"/>
+          <p:nvPr/>
+        </p:nvSpPr>
+        <p:spPr>
+          <a:xfrm flipH="1">
+            <a:off x="2005147" y="1035700"/>
+            <a:ext cx="9443514" cy="830997"/>
+          </a:xfrm>
+          <a:prstGeom prst="rect">
+            <a:avLst/>
+          </a:prstGeom>
+          <a:noFill/>
+        </p:spPr>
+        <p:txBody>
+          <a:bodyPr wrap="square" rtlCol="0">
+            <a:spAutoFit/>
+          </a:bodyPr>
+          <a:lstStyle/>
+          <a:p>
+            <a:r>
+              <a:rPr lang="en-IN" sz="4800" dirty="0"/>
+              <a:t>Single User Same  Action Analysis</a:t>
+            </a:r>
+          </a:p>
+        </p:txBody>
+      </p:sp>
+      <p:sp>
+        <p:nvSpPr>
+          <p:cNvPr id="2" name="TextBox 1">
+            <a:extLst>
+              <a:ext uri="{FF2B5EF4-FFF2-40B4-BE49-F238E27FC236}">
+                <a16:creationId xmlns:a16="http://schemas.microsoft.com/office/drawing/2014/main" id="{9138F097-77B8-4F62-8BE5-4C6C6D693CDE}"/>
+              </a:ext>
+            </a:extLst>
+          </p:cNvPr>
+          <p:cNvSpPr txBox="1"/>
+          <p:nvPr/>
+        </p:nvSpPr>
+        <p:spPr>
+          <a:xfrm>
+            <a:off x="3514725" y="2400300"/>
+            <a:ext cx="3895725" cy="923330"/>
+          </a:xfrm>
+          <a:prstGeom prst="rect">
+            <a:avLst/>
+          </a:prstGeom>
+          <a:noFill/>
+        </p:spPr>
+        <p:txBody>
+          <a:bodyPr wrap="square" rtlCol="0">
+            <a:spAutoFit/>
+          </a:bodyPr>
+          <a:lstStyle/>
+          <a:p>
+            <a:r>
+              <a:rPr lang="en-IN" dirty="0"/>
+              <a:t># Trials – 30</a:t>
+            </a:r>
+          </a:p>
+          <a:p>
+            <a:r>
+              <a:rPr lang="en-IN" dirty="0"/>
+              <a:t>Trials plotted in below slides</a:t>
+            </a:r>
+          </a:p>
+          <a:p>
+            <a:r>
+              <a:rPr lang="en-IN" dirty="0"/>
+              <a:t>Trial 1, 2, 15, 29,30</a:t>
+            </a:r>
+          </a:p>
+        </p:txBody>
+      </p:sp>
+    </p:spTree>
+    <p:extLst>
+      <p:ext uri="{BB962C8B-B14F-4D97-AF65-F5344CB8AC3E}">
+        <p14:creationId xmlns:p14="http://schemas.microsoft.com/office/powerpoint/2010/main" val="1839048697"/>
+      </p:ext>
+    </p:extLst>
+  </p:cSld>
+  <p:clrMapOvr>
+    <a:masterClrMapping/>
+  </p:clrMapOvr>
+</p:sld>
+</file>
+
+<file path=ppt/slides/slide23.xml><?xml version="1.0" encoding="utf-8"?>
+<p:sld xmlns:a="http://schemas.openxmlformats.org/drawingml/2006/main" xmlns:r="http://schemas.openxmlformats.org/officeDocument/2006/relationships" xmlns:p="http://schemas.openxmlformats.org/presentationml/2006/main">
+  <p:cSld>
+    <p:spTree>
+      <p:nvGrpSpPr>
+        <p:cNvPr id="1" name=""/>
+        <p:cNvGrpSpPr/>
+        <p:nvPr/>
+      </p:nvGrpSpPr>
+      <p:grpSpPr>
+        <a:xfrm>
+          <a:off x="0" y="0"/>
+          <a:ext cx="0" cy="0"/>
+          <a:chOff x="0" y="0"/>
+          <a:chExt cx="0" cy="0"/>
+        </a:xfrm>
+      </p:grpSpPr>
+      <p:pic>
+        <p:nvPicPr>
+          <p:cNvPr id="20" name="Picture 19">
+            <a:extLst>
+              <a:ext uri="{FF2B5EF4-FFF2-40B4-BE49-F238E27FC236}">
+                <a16:creationId xmlns:a16="http://schemas.microsoft.com/office/drawing/2014/main" id="{5E2DA371-1E4F-4CA1-8646-24603BD6996E}"/>
+              </a:ext>
+            </a:extLst>
+          </p:cNvPr>
+          <p:cNvPicPr>
+            <a:picLocks noChangeAspect="1"/>
+          </p:cNvPicPr>
+          <p:nvPr/>
+        </p:nvPicPr>
+        <p:blipFill>
+          <a:blip r:embed="rId2">
+            <a:extLst>
+              <a:ext uri="{28A0092B-C50C-407E-A947-70E740481C1C}">
+                <a14:useLocalDpi xmlns:a14="http://schemas.microsoft.com/office/drawing/2010/main" val="0"/>
+              </a:ext>
+            </a:extLst>
+          </a:blip>
+          <a:stretch>
+            <a:fillRect/>
+          </a:stretch>
+        </p:blipFill>
+        <p:spPr>
+          <a:xfrm>
+            <a:off x="7842818" y="23578"/>
+            <a:ext cx="4206307" cy="2681521"/>
+          </a:xfrm>
+          <a:prstGeom prst="rect">
+            <a:avLst/>
+          </a:prstGeom>
+        </p:spPr>
+      </p:pic>
+      <p:pic>
+        <p:nvPicPr>
+          <p:cNvPr id="22" name="Picture 21">
+            <a:extLst>
+              <a:ext uri="{FF2B5EF4-FFF2-40B4-BE49-F238E27FC236}">
+                <a16:creationId xmlns:a16="http://schemas.microsoft.com/office/drawing/2014/main" id="{DB21B103-7707-48AF-88C1-76FAAA66F30C}"/>
+              </a:ext>
+            </a:extLst>
+          </p:cNvPr>
+          <p:cNvPicPr>
+            <a:picLocks noChangeAspect="1"/>
+          </p:cNvPicPr>
+          <p:nvPr/>
+        </p:nvPicPr>
+        <p:blipFill>
+          <a:blip r:embed="rId3">
+            <a:extLst>
+              <a:ext uri="{28A0092B-C50C-407E-A947-70E740481C1C}">
+                <a14:useLocalDpi xmlns:a14="http://schemas.microsoft.com/office/drawing/2010/main" val="0"/>
+              </a:ext>
+            </a:extLst>
+          </a:blip>
+          <a:stretch>
+            <a:fillRect/>
+          </a:stretch>
+        </p:blipFill>
+        <p:spPr>
+          <a:xfrm>
+            <a:off x="3814867" y="2115685"/>
+            <a:ext cx="4455377" cy="2840302"/>
+          </a:xfrm>
+          <a:prstGeom prst="rect">
+            <a:avLst/>
+          </a:prstGeom>
+        </p:spPr>
+      </p:pic>
+      <p:pic>
+        <p:nvPicPr>
+          <p:cNvPr id="18" name="Picture 17">
+            <a:extLst>
+              <a:ext uri="{FF2B5EF4-FFF2-40B4-BE49-F238E27FC236}">
+                <a16:creationId xmlns:a16="http://schemas.microsoft.com/office/drawing/2014/main" id="{ECC8EB2F-2A0C-4DE9-9AAF-7BE6219F4E33}"/>
+              </a:ext>
+            </a:extLst>
+          </p:cNvPr>
+          <p:cNvPicPr>
+            <a:picLocks noChangeAspect="1"/>
+          </p:cNvPicPr>
+          <p:nvPr/>
+        </p:nvPicPr>
+        <p:blipFill>
+          <a:blip r:embed="rId4">
+            <a:extLst>
+              <a:ext uri="{28A0092B-C50C-407E-A947-70E740481C1C}">
+                <a14:useLocalDpi xmlns:a14="http://schemas.microsoft.com/office/drawing/2010/main" val="0"/>
+              </a:ext>
+            </a:extLst>
+          </a:blip>
+          <a:stretch>
+            <a:fillRect/>
+          </a:stretch>
+        </p:blipFill>
+        <p:spPr>
+          <a:xfrm>
+            <a:off x="71966" y="23578"/>
+            <a:ext cx="4052359" cy="2583379"/>
+          </a:xfrm>
+          <a:prstGeom prst="rect">
+            <a:avLst/>
+          </a:prstGeom>
+        </p:spPr>
+      </p:pic>
+      <p:pic>
+        <p:nvPicPr>
+          <p:cNvPr id="24" name="Picture 23">
+            <a:extLst>
+              <a:ext uri="{FF2B5EF4-FFF2-40B4-BE49-F238E27FC236}">
+                <a16:creationId xmlns:a16="http://schemas.microsoft.com/office/drawing/2014/main" id="{4DD26254-EF79-4142-96D5-E61E3483F593}"/>
+              </a:ext>
+            </a:extLst>
+          </p:cNvPr>
+          <p:cNvPicPr>
+            <a:picLocks noChangeAspect="1"/>
+          </p:cNvPicPr>
+          <p:nvPr/>
+        </p:nvPicPr>
+        <p:blipFill>
+          <a:blip r:embed="rId5">
+            <a:extLst>
+              <a:ext uri="{28A0092B-C50C-407E-A947-70E740481C1C}">
+                <a14:useLocalDpi xmlns:a14="http://schemas.microsoft.com/office/drawing/2010/main" val="0"/>
+              </a:ext>
+            </a:extLst>
+          </a:blip>
+          <a:stretch>
+            <a:fillRect/>
+          </a:stretch>
+        </p:blipFill>
+        <p:spPr>
+          <a:xfrm>
+            <a:off x="0" y="3689763"/>
+            <a:ext cx="4124325" cy="2629256"/>
+          </a:xfrm>
+          <a:prstGeom prst="rect">
+            <a:avLst/>
+          </a:prstGeom>
+        </p:spPr>
+      </p:pic>
+      <p:pic>
+        <p:nvPicPr>
+          <p:cNvPr id="16" name="Picture 15">
+            <a:extLst>
+              <a:ext uri="{FF2B5EF4-FFF2-40B4-BE49-F238E27FC236}">
+                <a16:creationId xmlns:a16="http://schemas.microsoft.com/office/drawing/2014/main" id="{878DD863-6E7F-46B8-BC70-5FA457269B20}"/>
+              </a:ext>
+            </a:extLst>
+          </p:cNvPr>
+          <p:cNvPicPr>
+            <a:picLocks noChangeAspect="1"/>
+          </p:cNvPicPr>
+          <p:nvPr/>
+        </p:nvPicPr>
+        <p:blipFill>
+          <a:blip r:embed="rId6">
+            <a:extLst>
+              <a:ext uri="{28A0092B-C50C-407E-A947-70E740481C1C}">
+                <a14:useLocalDpi xmlns:a14="http://schemas.microsoft.com/office/drawing/2010/main" val="0"/>
+              </a:ext>
+            </a:extLst>
+          </a:blip>
+          <a:stretch>
+            <a:fillRect/>
+          </a:stretch>
+        </p:blipFill>
+        <p:spPr>
+          <a:xfrm>
+            <a:off x="8220075" y="3814913"/>
+            <a:ext cx="3829050" cy="2441019"/>
+          </a:xfrm>
+          <a:prstGeom prst="rect">
+            <a:avLst/>
+          </a:prstGeom>
+        </p:spPr>
+      </p:pic>
+    </p:spTree>
+    <p:extLst>
+      <p:ext uri="{BB962C8B-B14F-4D97-AF65-F5344CB8AC3E}">
+        <p14:creationId xmlns:p14="http://schemas.microsoft.com/office/powerpoint/2010/main" val="3766525379"/>
+      </p:ext>
+    </p:extLst>
+  </p:cSld>
+  <p:clrMapOvr>
+    <a:masterClrMapping/>
+  </p:clrMapOvr>
+</p:sld>
+</file>
+
+<file path=ppt/slides/slide24.xml><?xml version="1.0" encoding="utf-8"?>
+<p:sld xmlns:a="http://schemas.openxmlformats.org/drawingml/2006/main" xmlns:r="http://schemas.openxmlformats.org/officeDocument/2006/relationships" xmlns:p="http://schemas.openxmlformats.org/presentationml/2006/main">
+  <p:cSld>
+    <p:spTree>
+      <p:nvGrpSpPr>
+        <p:cNvPr id="1" name=""/>
+        <p:cNvGrpSpPr/>
+        <p:nvPr/>
+      </p:nvGrpSpPr>
+      <p:grpSpPr>
+        <a:xfrm>
+          <a:off x="0" y="0"/>
+          <a:ext cx="0" cy="0"/>
+          <a:chOff x="0" y="0"/>
+          <a:chExt cx="0" cy="0"/>
+        </a:xfrm>
+      </p:grpSpPr>
+      <p:pic>
+        <p:nvPicPr>
+          <p:cNvPr id="3" name="Picture 2">
+            <a:extLst>
+              <a:ext uri="{FF2B5EF4-FFF2-40B4-BE49-F238E27FC236}">
+                <a16:creationId xmlns:a16="http://schemas.microsoft.com/office/drawing/2014/main" id="{499EBDA3-2793-45CF-BD61-6A7BB89F9394}"/>
+              </a:ext>
+            </a:extLst>
+          </p:cNvPr>
+          <p:cNvPicPr>
+            <a:picLocks noChangeAspect="1"/>
+          </p:cNvPicPr>
+          <p:nvPr/>
+        </p:nvPicPr>
+        <p:blipFill>
+          <a:blip r:embed="rId3">
+            <a:extLst>
+              <a:ext uri="{28A0092B-C50C-407E-A947-70E740481C1C}">
+                <a14:useLocalDpi xmlns:a14="http://schemas.microsoft.com/office/drawing/2010/main" val="0"/>
+              </a:ext>
+            </a:extLst>
+          </a:blip>
+          <a:stretch>
+            <a:fillRect/>
+          </a:stretch>
+        </p:blipFill>
+        <p:spPr>
+          <a:xfrm>
+            <a:off x="7897953" y="4100076"/>
+            <a:ext cx="4333880" cy="2757924"/>
+          </a:xfrm>
+          <a:prstGeom prst="rect">
+            <a:avLst/>
+          </a:prstGeom>
+        </p:spPr>
+      </p:pic>
+      <p:pic>
+        <p:nvPicPr>
+          <p:cNvPr id="5" name="Picture 4">
+            <a:extLst>
+              <a:ext uri="{FF2B5EF4-FFF2-40B4-BE49-F238E27FC236}">
+                <a16:creationId xmlns:a16="http://schemas.microsoft.com/office/drawing/2014/main" id="{4CDB309F-A821-4751-ADE8-EB5BBA48D301}"/>
+              </a:ext>
+            </a:extLst>
+          </p:cNvPr>
+          <p:cNvPicPr>
+            <a:picLocks noChangeAspect="1"/>
+          </p:cNvPicPr>
+          <p:nvPr/>
+        </p:nvPicPr>
+        <p:blipFill>
+          <a:blip r:embed="rId4">
+            <a:extLst>
+              <a:ext uri="{28A0092B-C50C-407E-A947-70E740481C1C}">
+                <a14:useLocalDpi xmlns:a14="http://schemas.microsoft.com/office/drawing/2010/main" val="0"/>
+              </a:ext>
+            </a:extLst>
+          </a:blip>
+          <a:stretch>
+            <a:fillRect/>
+          </a:stretch>
+        </p:blipFill>
+        <p:spPr>
+          <a:xfrm>
+            <a:off x="102415" y="-32656"/>
+            <a:ext cx="4531824" cy="2883888"/>
+          </a:xfrm>
+          <a:prstGeom prst="rect">
+            <a:avLst/>
+          </a:prstGeom>
+        </p:spPr>
+      </p:pic>
+      <p:pic>
+        <p:nvPicPr>
+          <p:cNvPr id="7" name="Picture 6">
+            <a:extLst>
+              <a:ext uri="{FF2B5EF4-FFF2-40B4-BE49-F238E27FC236}">
+                <a16:creationId xmlns:a16="http://schemas.microsoft.com/office/drawing/2014/main" id="{DA6ED571-56CB-439B-8FE8-B3C38E8A281D}"/>
+              </a:ext>
+            </a:extLst>
+          </p:cNvPr>
+          <p:cNvPicPr>
+            <a:picLocks noChangeAspect="1"/>
+          </p:cNvPicPr>
+          <p:nvPr/>
+        </p:nvPicPr>
+        <p:blipFill>
+          <a:blip r:embed="rId5">
+            <a:extLst>
+              <a:ext uri="{28A0092B-C50C-407E-A947-70E740481C1C}">
+                <a14:useLocalDpi xmlns:a14="http://schemas.microsoft.com/office/drawing/2010/main" val="0"/>
+              </a:ext>
+            </a:extLst>
+          </a:blip>
+          <a:stretch>
+            <a:fillRect/>
+          </a:stretch>
+        </p:blipFill>
+        <p:spPr>
+          <a:xfrm>
+            <a:off x="7711493" y="0"/>
+            <a:ext cx="4480507" cy="2851232"/>
+          </a:xfrm>
+          <a:prstGeom prst="rect">
+            <a:avLst/>
+          </a:prstGeom>
+        </p:spPr>
+      </p:pic>
+      <p:pic>
+        <p:nvPicPr>
+          <p:cNvPr id="9" name="Picture 8">
+            <a:extLst>
+              <a:ext uri="{FF2B5EF4-FFF2-40B4-BE49-F238E27FC236}">
+                <a16:creationId xmlns:a16="http://schemas.microsoft.com/office/drawing/2014/main" id="{73901019-C3CB-4E4E-A906-74D89EAFD6E3}"/>
+              </a:ext>
+            </a:extLst>
+          </p:cNvPr>
+          <p:cNvPicPr>
+            <a:picLocks noChangeAspect="1"/>
+          </p:cNvPicPr>
+          <p:nvPr/>
+        </p:nvPicPr>
+        <p:blipFill>
+          <a:blip r:embed="rId6">
+            <a:extLst>
+              <a:ext uri="{28A0092B-C50C-407E-A947-70E740481C1C}">
+                <a14:useLocalDpi xmlns:a14="http://schemas.microsoft.com/office/drawing/2010/main" val="0"/>
+              </a:ext>
+            </a:extLst>
+          </a:blip>
+          <a:stretch>
+            <a:fillRect/>
+          </a:stretch>
+        </p:blipFill>
+        <p:spPr>
+          <a:xfrm>
+            <a:off x="4294048" y="2171335"/>
+            <a:ext cx="3952661" cy="2515330"/>
+          </a:xfrm>
+          <a:prstGeom prst="rect">
+            <a:avLst/>
+          </a:prstGeom>
+        </p:spPr>
+      </p:pic>
+      <p:pic>
+        <p:nvPicPr>
+          <p:cNvPr id="11" name="Picture 10">
+            <a:extLst>
+              <a:ext uri="{FF2B5EF4-FFF2-40B4-BE49-F238E27FC236}">
+                <a16:creationId xmlns:a16="http://schemas.microsoft.com/office/drawing/2014/main" id="{1E660D9F-2653-4E62-94FA-D16B5FD223CC}"/>
+              </a:ext>
+            </a:extLst>
+          </p:cNvPr>
+          <p:cNvPicPr>
+            <a:picLocks noChangeAspect="1"/>
+          </p:cNvPicPr>
+          <p:nvPr/>
+        </p:nvPicPr>
+        <p:blipFill>
+          <a:blip r:embed="rId7">
+            <a:extLst>
+              <a:ext uri="{28A0092B-C50C-407E-A947-70E740481C1C}">
+                <a14:useLocalDpi xmlns:a14="http://schemas.microsoft.com/office/drawing/2010/main" val="0"/>
+              </a:ext>
+            </a:extLst>
+          </a:blip>
+          <a:stretch>
+            <a:fillRect/>
+          </a:stretch>
+        </p:blipFill>
+        <p:spPr>
+          <a:xfrm>
+            <a:off x="0" y="4006769"/>
+            <a:ext cx="4480505" cy="2851231"/>
+          </a:xfrm>
+          <a:prstGeom prst="rect">
+            <a:avLst/>
+          </a:prstGeom>
+        </p:spPr>
+      </p:pic>
+    </p:spTree>
+    <p:extLst>
+      <p:ext uri="{BB962C8B-B14F-4D97-AF65-F5344CB8AC3E}">
+        <p14:creationId xmlns:p14="http://schemas.microsoft.com/office/powerpoint/2010/main" val="3352860464"/>
+      </p:ext>
+    </p:extLst>
+  </p:cSld>
+  <p:clrMapOvr>
+    <a:masterClrMapping/>
+  </p:clrMapOvr>
+</p:sld>
+</file>
+
+<file path=ppt/slides/slide25.xml><?xml version="1.0" encoding="utf-8"?>
+<p:sld xmlns:a="http://schemas.openxmlformats.org/drawingml/2006/main" xmlns:r="http://schemas.openxmlformats.org/officeDocument/2006/relationships" xmlns:p="http://schemas.openxmlformats.org/presentationml/2006/main">
+  <p:cSld>
+    <p:spTree>
+      <p:nvGrpSpPr>
+        <p:cNvPr id="1" name=""/>
+        <p:cNvGrpSpPr/>
+        <p:nvPr/>
+      </p:nvGrpSpPr>
+      <p:grpSpPr>
+        <a:xfrm>
+          <a:off x="0" y="0"/>
+          <a:ext cx="0" cy="0"/>
+          <a:chOff x="0" y="0"/>
+          <a:chExt cx="0" cy="0"/>
+        </a:xfrm>
+      </p:grpSpPr>
+      <p:pic>
+        <p:nvPicPr>
+          <p:cNvPr id="3" name="Picture 2">
+            <a:extLst>
+              <a:ext uri="{FF2B5EF4-FFF2-40B4-BE49-F238E27FC236}">
+                <a16:creationId xmlns:a16="http://schemas.microsoft.com/office/drawing/2014/main" id="{CA4C74B9-E7F6-4E4B-BC96-3C15DF0ACA7D}"/>
+              </a:ext>
+            </a:extLst>
+          </p:cNvPr>
+          <p:cNvPicPr>
+            <a:picLocks noChangeAspect="1"/>
+          </p:cNvPicPr>
+          <p:nvPr/>
+        </p:nvPicPr>
+        <p:blipFill>
+          <a:blip r:embed="rId2">
+            <a:extLst>
+              <a:ext uri="{28A0092B-C50C-407E-A947-70E740481C1C}">
+                <a14:useLocalDpi xmlns:a14="http://schemas.microsoft.com/office/drawing/2010/main" val="0"/>
+              </a:ext>
+            </a:extLst>
+          </a:blip>
+          <a:stretch>
+            <a:fillRect/>
+          </a:stretch>
+        </p:blipFill>
+        <p:spPr>
+          <a:xfrm>
+            <a:off x="8390185" y="0"/>
+            <a:ext cx="3801815" cy="2419337"/>
+          </a:xfrm>
+          <a:prstGeom prst="rect">
+            <a:avLst/>
+          </a:prstGeom>
+        </p:spPr>
+      </p:pic>
+      <p:pic>
+        <p:nvPicPr>
+          <p:cNvPr id="5" name="Picture 4">
+            <a:extLst>
+              <a:ext uri="{FF2B5EF4-FFF2-40B4-BE49-F238E27FC236}">
+                <a16:creationId xmlns:a16="http://schemas.microsoft.com/office/drawing/2014/main" id="{95D2072B-732C-41E0-B377-9334EC6A240B}"/>
+              </a:ext>
+            </a:extLst>
+          </p:cNvPr>
+          <p:cNvPicPr>
+            <a:picLocks noChangeAspect="1"/>
+          </p:cNvPicPr>
+          <p:nvPr/>
+        </p:nvPicPr>
+        <p:blipFill>
+          <a:blip r:embed="rId3">
+            <a:extLst>
+              <a:ext uri="{28A0092B-C50C-407E-A947-70E740481C1C}">
+                <a14:useLocalDpi xmlns:a14="http://schemas.microsoft.com/office/drawing/2010/main" val="0"/>
+              </a:ext>
+            </a:extLst>
+          </a:blip>
+          <a:stretch>
+            <a:fillRect/>
+          </a:stretch>
+        </p:blipFill>
+        <p:spPr>
+          <a:xfrm>
+            <a:off x="67279" y="0"/>
+            <a:ext cx="3923337" cy="2496669"/>
+          </a:xfrm>
+          <a:prstGeom prst="rect">
+            <a:avLst/>
+          </a:prstGeom>
+        </p:spPr>
+      </p:pic>
+      <p:pic>
+        <p:nvPicPr>
+          <p:cNvPr id="7" name="Picture 6">
+            <a:extLst>
+              <a:ext uri="{FF2B5EF4-FFF2-40B4-BE49-F238E27FC236}">
+                <a16:creationId xmlns:a16="http://schemas.microsoft.com/office/drawing/2014/main" id="{CC5E2CFD-099D-4616-8526-63468BD82CD1}"/>
+              </a:ext>
+            </a:extLst>
+          </p:cNvPr>
+          <p:cNvPicPr>
+            <a:picLocks noChangeAspect="1"/>
+          </p:cNvPicPr>
+          <p:nvPr/>
+        </p:nvPicPr>
+        <p:blipFill>
+          <a:blip r:embed="rId4">
+            <a:extLst>
+              <a:ext uri="{28A0092B-C50C-407E-A947-70E740481C1C}">
+                <a14:useLocalDpi xmlns:a14="http://schemas.microsoft.com/office/drawing/2010/main" val="0"/>
+              </a:ext>
+            </a:extLst>
+          </a:blip>
+          <a:stretch>
+            <a:fillRect/>
+          </a:stretch>
+        </p:blipFill>
+        <p:spPr>
+          <a:xfrm>
+            <a:off x="4295034" y="1066404"/>
+            <a:ext cx="4437279" cy="2823723"/>
+          </a:xfrm>
+          <a:prstGeom prst="rect">
+            <a:avLst/>
+          </a:prstGeom>
+        </p:spPr>
+      </p:pic>
+      <p:pic>
+        <p:nvPicPr>
+          <p:cNvPr id="9" name="Picture 8">
+            <a:extLst>
+              <a:ext uri="{FF2B5EF4-FFF2-40B4-BE49-F238E27FC236}">
+                <a16:creationId xmlns:a16="http://schemas.microsoft.com/office/drawing/2014/main" id="{EBB3D2D6-8256-4071-A609-41C207FD1E65}"/>
+              </a:ext>
+            </a:extLst>
+          </p:cNvPr>
+          <p:cNvPicPr>
+            <a:picLocks noChangeAspect="1"/>
+          </p:cNvPicPr>
+          <p:nvPr/>
+        </p:nvPicPr>
+        <p:blipFill>
+          <a:blip r:embed="rId5">
+            <a:extLst>
+              <a:ext uri="{28A0092B-C50C-407E-A947-70E740481C1C}">
+                <a14:useLocalDpi xmlns:a14="http://schemas.microsoft.com/office/drawing/2010/main" val="0"/>
+              </a:ext>
+            </a:extLst>
+          </a:blip>
+          <a:stretch>
+            <a:fillRect/>
+          </a:stretch>
+        </p:blipFill>
+        <p:spPr>
+          <a:xfrm>
+            <a:off x="8238930" y="4342410"/>
+            <a:ext cx="3953069" cy="2515590"/>
+          </a:xfrm>
+          <a:prstGeom prst="rect">
+            <a:avLst/>
+          </a:prstGeom>
+        </p:spPr>
+      </p:pic>
+      <p:pic>
+        <p:nvPicPr>
+          <p:cNvPr id="11" name="Picture 10">
+            <a:extLst>
+              <a:ext uri="{FF2B5EF4-FFF2-40B4-BE49-F238E27FC236}">
+                <a16:creationId xmlns:a16="http://schemas.microsoft.com/office/drawing/2014/main" id="{27605EAE-C226-4430-9BBB-05109B55C4CF}"/>
+              </a:ext>
+            </a:extLst>
+          </p:cNvPr>
+          <p:cNvPicPr>
+            <a:picLocks noChangeAspect="1"/>
+          </p:cNvPicPr>
+          <p:nvPr/>
+        </p:nvPicPr>
+        <p:blipFill>
+          <a:blip r:embed="rId6">
+            <a:extLst>
+              <a:ext uri="{28A0092B-C50C-407E-A947-70E740481C1C}">
+                <a14:useLocalDpi xmlns:a14="http://schemas.microsoft.com/office/drawing/2010/main" val="0"/>
+              </a:ext>
+            </a:extLst>
+          </a:blip>
+          <a:stretch>
+            <a:fillRect/>
+          </a:stretch>
+        </p:blipFill>
+        <p:spPr>
+          <a:xfrm>
+            <a:off x="0" y="3810826"/>
+            <a:ext cx="4788416" cy="3047174"/>
+          </a:xfrm>
+          <a:prstGeom prst="rect">
+            <a:avLst/>
+          </a:prstGeom>
+        </p:spPr>
+      </p:pic>
+    </p:spTree>
+    <p:extLst>
+      <p:ext uri="{BB962C8B-B14F-4D97-AF65-F5344CB8AC3E}">
+        <p14:creationId xmlns:p14="http://schemas.microsoft.com/office/powerpoint/2010/main" val="2406576312"/>
+      </p:ext>
+    </p:extLst>
+  </p:cSld>
+  <p:clrMapOvr>
+    <a:masterClrMapping/>
+  </p:clrMapOvr>
+</p:sld>
+</file>
+
+<file path=ppt/slides/slide26.xml><?xml version="1.0" encoding="utf-8"?>
+<p:sld xmlns:a="http://schemas.openxmlformats.org/drawingml/2006/main" xmlns:r="http://schemas.openxmlformats.org/officeDocument/2006/relationships" xmlns:p="http://schemas.openxmlformats.org/presentationml/2006/main">
+  <p:cSld>
+    <p:spTree>
+      <p:nvGrpSpPr>
+        <p:cNvPr id="1" name=""/>
+        <p:cNvGrpSpPr/>
+        <p:nvPr/>
+      </p:nvGrpSpPr>
+      <p:grpSpPr>
+        <a:xfrm>
+          <a:off x="0" y="0"/>
+          <a:ext cx="0" cy="0"/>
+          <a:chOff x="0" y="0"/>
+          <a:chExt cx="0" cy="0"/>
+        </a:xfrm>
+      </p:grpSpPr>
+      <p:sp>
+        <p:nvSpPr>
+          <p:cNvPr id="8" name="TextBox 7">
+            <a:extLst>
+              <a:ext uri="{FF2B5EF4-FFF2-40B4-BE49-F238E27FC236}">
+                <a16:creationId xmlns:a16="http://schemas.microsoft.com/office/drawing/2014/main" id="{1F34BF87-1BB9-43E2-ADFA-42C3405326CF}"/>
+              </a:ext>
+            </a:extLst>
+          </p:cNvPr>
+          <p:cNvSpPr txBox="1"/>
+          <p:nvPr/>
+        </p:nvSpPr>
+        <p:spPr>
+          <a:xfrm flipH="1">
+            <a:off x="2005147" y="998376"/>
+            <a:ext cx="9443514" cy="830997"/>
+          </a:xfrm>
+          <a:prstGeom prst="rect">
+            <a:avLst/>
+          </a:prstGeom>
+          <a:noFill/>
+        </p:spPr>
+        <p:txBody>
+          <a:bodyPr wrap="square" rtlCol="0">
+            <a:spAutoFit/>
+          </a:bodyPr>
+          <a:lstStyle/>
+          <a:p>
+            <a:r>
+              <a:rPr lang="en-IN" sz="4800" dirty="0"/>
+              <a:t>Different User Same Action Analysis</a:t>
+            </a:r>
+          </a:p>
+        </p:txBody>
+      </p:sp>
+      <p:sp>
+        <p:nvSpPr>
+          <p:cNvPr id="9" name="TextBox 8">
+            <a:extLst>
+              <a:ext uri="{FF2B5EF4-FFF2-40B4-BE49-F238E27FC236}">
+                <a16:creationId xmlns:a16="http://schemas.microsoft.com/office/drawing/2014/main" id="{21DB9722-0AB8-40C6-9325-58BB1A17D829}"/>
+              </a:ext>
+            </a:extLst>
+          </p:cNvPr>
+          <p:cNvSpPr txBox="1"/>
+          <p:nvPr/>
+        </p:nvSpPr>
+        <p:spPr>
+          <a:xfrm>
+            <a:off x="3914775" y="2200275"/>
+            <a:ext cx="3848100" cy="369332"/>
+          </a:xfrm>
+          <a:prstGeom prst="rect">
+            <a:avLst/>
+          </a:prstGeom>
+          <a:noFill/>
+        </p:spPr>
+        <p:txBody>
+          <a:bodyPr wrap="square" rtlCol="0">
+            <a:spAutoFit/>
+          </a:bodyPr>
+          <a:lstStyle/>
+          <a:p>
+            <a:r>
+              <a:rPr lang="en-IN" dirty="0"/>
+              <a:t>First Trial of each user is considered</a:t>
+            </a:r>
+          </a:p>
+        </p:txBody>
+      </p:sp>
+    </p:spTree>
+    <p:extLst>
+      <p:ext uri="{BB962C8B-B14F-4D97-AF65-F5344CB8AC3E}">
+        <p14:creationId xmlns:p14="http://schemas.microsoft.com/office/powerpoint/2010/main" val="3191864914"/>
+      </p:ext>
+    </p:extLst>
+  </p:cSld>
+  <p:clrMapOvr>
+    <a:masterClrMapping/>
+  </p:clrMapOvr>
+</p:sld>
+</file>
+
+<file path=ppt/slides/slide27.xml><?xml version="1.0" encoding="utf-8"?>
+<p:sld xmlns:a="http://schemas.openxmlformats.org/drawingml/2006/main" xmlns:r="http://schemas.openxmlformats.org/officeDocument/2006/relationships" xmlns:p="http://schemas.openxmlformats.org/presentationml/2006/main">
+  <p:cSld>
+    <p:spTree>
+      <p:nvGrpSpPr>
+        <p:cNvPr id="1" name=""/>
+        <p:cNvGrpSpPr/>
+        <p:nvPr/>
+      </p:nvGrpSpPr>
+      <p:grpSpPr>
+        <a:xfrm>
+          <a:off x="0" y="0"/>
+          <a:ext cx="0" cy="0"/>
+          <a:chOff x="0" y="0"/>
+          <a:chExt cx="0" cy="0"/>
+        </a:xfrm>
+      </p:grpSpPr>
+      <p:pic>
+        <p:nvPicPr>
+          <p:cNvPr id="13" name="Picture 12">
+            <a:extLst>
+              <a:ext uri="{FF2B5EF4-FFF2-40B4-BE49-F238E27FC236}">
+                <a16:creationId xmlns:a16="http://schemas.microsoft.com/office/drawing/2014/main" id="{B86EB9D0-75EA-4E7D-9004-BBB205EB9C04}"/>
+              </a:ext>
+            </a:extLst>
+          </p:cNvPr>
+          <p:cNvPicPr>
+            <a:picLocks noChangeAspect="1"/>
+          </p:cNvPicPr>
+          <p:nvPr/>
+        </p:nvPicPr>
+        <p:blipFill>
+          <a:blip r:embed="rId2">
+            <a:extLst>
+              <a:ext uri="{28A0092B-C50C-407E-A947-70E740481C1C}">
+                <a14:useLocalDpi xmlns:a14="http://schemas.microsoft.com/office/drawing/2010/main" val="0"/>
+              </a:ext>
+            </a:extLst>
+          </a:blip>
+          <a:stretch>
+            <a:fillRect/>
+          </a:stretch>
+        </p:blipFill>
+        <p:spPr>
+          <a:xfrm>
+            <a:off x="-2" y="8103"/>
+            <a:ext cx="4356105" cy="2777017"/>
+          </a:xfrm>
+          <a:prstGeom prst="rect">
+            <a:avLst/>
+          </a:prstGeom>
+        </p:spPr>
+      </p:pic>
+      <p:pic>
+        <p:nvPicPr>
+          <p:cNvPr id="7" name="Picture 6">
+            <a:extLst>
+              <a:ext uri="{FF2B5EF4-FFF2-40B4-BE49-F238E27FC236}">
+                <a16:creationId xmlns:a16="http://schemas.microsoft.com/office/drawing/2014/main" id="{CD98396E-8AE5-4B29-AEE4-1D3D94DC5924}"/>
+              </a:ext>
+            </a:extLst>
+          </p:cNvPr>
+          <p:cNvPicPr>
+            <a:picLocks noChangeAspect="1"/>
+          </p:cNvPicPr>
+          <p:nvPr/>
+        </p:nvPicPr>
+        <p:blipFill>
+          <a:blip r:embed="rId3">
+            <a:extLst>
+              <a:ext uri="{28A0092B-C50C-407E-A947-70E740481C1C}">
+                <a14:useLocalDpi xmlns:a14="http://schemas.microsoft.com/office/drawing/2010/main" val="0"/>
+              </a:ext>
+            </a:extLst>
+          </a:blip>
+          <a:stretch>
+            <a:fillRect/>
+          </a:stretch>
+        </p:blipFill>
+        <p:spPr>
+          <a:xfrm>
+            <a:off x="3975566" y="2226413"/>
+            <a:ext cx="4356104" cy="2777016"/>
+          </a:xfrm>
+          <a:prstGeom prst="rect">
+            <a:avLst/>
+          </a:prstGeom>
+        </p:spPr>
+      </p:pic>
+      <p:pic>
+        <p:nvPicPr>
+          <p:cNvPr id="5" name="Picture 4">
+            <a:extLst>
+              <a:ext uri="{FF2B5EF4-FFF2-40B4-BE49-F238E27FC236}">
+                <a16:creationId xmlns:a16="http://schemas.microsoft.com/office/drawing/2014/main" id="{8C523334-A4F5-479C-BD1F-D281057C99D1}"/>
+              </a:ext>
+            </a:extLst>
+          </p:cNvPr>
+          <p:cNvPicPr>
+            <a:picLocks noChangeAspect="1"/>
+          </p:cNvPicPr>
+          <p:nvPr/>
+        </p:nvPicPr>
+        <p:blipFill>
+          <a:blip r:embed="rId4">
+            <a:extLst>
+              <a:ext uri="{28A0092B-C50C-407E-A947-70E740481C1C}">
+                <a14:useLocalDpi xmlns:a14="http://schemas.microsoft.com/office/drawing/2010/main" val="0"/>
+              </a:ext>
+            </a:extLst>
+          </a:blip>
+          <a:stretch>
+            <a:fillRect/>
+          </a:stretch>
+        </p:blipFill>
+        <p:spPr>
+          <a:xfrm>
+            <a:off x="7951130" y="0"/>
+            <a:ext cx="4219443" cy="2689894"/>
+          </a:xfrm>
+          <a:prstGeom prst="rect">
+            <a:avLst/>
+          </a:prstGeom>
+        </p:spPr>
+      </p:pic>
+      <p:pic>
+        <p:nvPicPr>
+          <p:cNvPr id="9" name="Picture 8">
+            <a:extLst>
+              <a:ext uri="{FF2B5EF4-FFF2-40B4-BE49-F238E27FC236}">
+                <a16:creationId xmlns:a16="http://schemas.microsoft.com/office/drawing/2014/main" id="{AFFA5EB6-AD51-4ACB-B89A-5E054B9783BE}"/>
+              </a:ext>
+            </a:extLst>
+          </p:cNvPr>
+          <p:cNvPicPr>
+            <a:picLocks noChangeAspect="1"/>
+          </p:cNvPicPr>
+          <p:nvPr/>
+        </p:nvPicPr>
+        <p:blipFill>
+          <a:blip r:embed="rId5">
+            <a:extLst>
+              <a:ext uri="{28A0092B-C50C-407E-A947-70E740481C1C}">
+                <a14:useLocalDpi xmlns:a14="http://schemas.microsoft.com/office/drawing/2010/main" val="0"/>
+              </a:ext>
+            </a:extLst>
+          </a:blip>
+          <a:stretch>
+            <a:fillRect/>
+          </a:stretch>
+        </p:blipFill>
+        <p:spPr>
+          <a:xfrm>
+            <a:off x="-2" y="3857240"/>
+            <a:ext cx="3921761" cy="2500122"/>
+          </a:xfrm>
+          <a:prstGeom prst="rect">
+            <a:avLst/>
+          </a:prstGeom>
+        </p:spPr>
+      </p:pic>
+      <p:pic>
+        <p:nvPicPr>
+          <p:cNvPr id="11" name="Picture 10">
+            <a:extLst>
+              <a:ext uri="{FF2B5EF4-FFF2-40B4-BE49-F238E27FC236}">
+                <a16:creationId xmlns:a16="http://schemas.microsoft.com/office/drawing/2014/main" id="{7E91FF50-DDE4-47A4-A5C3-ED997A134DA5}"/>
+              </a:ext>
+            </a:extLst>
+          </p:cNvPr>
+          <p:cNvPicPr>
+            <a:picLocks noChangeAspect="1"/>
+          </p:cNvPicPr>
+          <p:nvPr/>
+        </p:nvPicPr>
+        <p:blipFill>
+          <a:blip r:embed="rId6">
+            <a:extLst>
+              <a:ext uri="{28A0092B-C50C-407E-A947-70E740481C1C}">
+                <a14:useLocalDpi xmlns:a14="http://schemas.microsoft.com/office/drawing/2010/main" val="0"/>
+              </a:ext>
+            </a:extLst>
+          </a:blip>
+          <a:stretch>
+            <a:fillRect/>
+          </a:stretch>
+        </p:blipFill>
+        <p:spPr>
+          <a:xfrm>
+            <a:off x="8308763" y="3888513"/>
+            <a:ext cx="3921761" cy="2500122"/>
+          </a:xfrm>
+          <a:prstGeom prst="rect">
+            <a:avLst/>
+          </a:prstGeom>
+        </p:spPr>
+      </p:pic>
+    </p:spTree>
+    <p:extLst>
+      <p:ext uri="{BB962C8B-B14F-4D97-AF65-F5344CB8AC3E}">
+        <p14:creationId xmlns:p14="http://schemas.microsoft.com/office/powerpoint/2010/main" val="2686775760"/>
+      </p:ext>
+    </p:extLst>
+  </p:cSld>
+  <p:clrMapOvr>
+    <a:masterClrMapping/>
+  </p:clrMapOvr>
+</p:sld>
+</file>
+
+<file path=ppt/slides/slide28.xml><?xml version="1.0" encoding="utf-8"?>
+<p:sld xmlns:a="http://schemas.openxmlformats.org/drawingml/2006/main" xmlns:r="http://schemas.openxmlformats.org/officeDocument/2006/relationships" xmlns:p="http://schemas.openxmlformats.org/presentationml/2006/main">
+  <p:cSld>
+    <p:spTree>
+      <p:nvGrpSpPr>
+        <p:cNvPr id="1" name=""/>
+        <p:cNvGrpSpPr/>
+        <p:nvPr/>
+      </p:nvGrpSpPr>
+      <p:grpSpPr>
+        <a:xfrm>
+          <a:off x="0" y="0"/>
+          <a:ext cx="0" cy="0"/>
+          <a:chOff x="0" y="0"/>
+          <a:chExt cx="0" cy="0"/>
+        </a:xfrm>
+      </p:grpSpPr>
+      <p:pic>
+        <p:nvPicPr>
+          <p:cNvPr id="3" name="Picture 2">
+            <a:extLst>
+              <a:ext uri="{FF2B5EF4-FFF2-40B4-BE49-F238E27FC236}">
+                <a16:creationId xmlns:a16="http://schemas.microsoft.com/office/drawing/2014/main" id="{FDE284DA-9C12-48AB-B7B2-66198DD817BD}"/>
+              </a:ext>
+            </a:extLst>
+          </p:cNvPr>
+          <p:cNvPicPr>
+            <a:picLocks noChangeAspect="1"/>
+          </p:cNvPicPr>
+          <p:nvPr/>
+        </p:nvPicPr>
+        <p:blipFill>
+          <a:blip r:embed="rId2">
+            <a:extLst>
+              <a:ext uri="{28A0092B-C50C-407E-A947-70E740481C1C}">
+                <a14:useLocalDpi xmlns:a14="http://schemas.microsoft.com/office/drawing/2010/main" val="0"/>
+              </a:ext>
+            </a:extLst>
+          </a:blip>
+          <a:stretch>
+            <a:fillRect/>
+          </a:stretch>
+        </p:blipFill>
+        <p:spPr>
+          <a:xfrm>
+            <a:off x="3854398" y="2118098"/>
+            <a:ext cx="3908672" cy="2487337"/>
+          </a:xfrm>
+          <a:prstGeom prst="rect">
+            <a:avLst/>
+          </a:prstGeom>
+        </p:spPr>
+      </p:pic>
+      <p:pic>
+        <p:nvPicPr>
+          <p:cNvPr id="5" name="Picture 4">
+            <a:extLst>
+              <a:ext uri="{FF2B5EF4-FFF2-40B4-BE49-F238E27FC236}">
+                <a16:creationId xmlns:a16="http://schemas.microsoft.com/office/drawing/2014/main" id="{B870F6AD-5A27-47B1-8283-32EBF99A692C}"/>
+              </a:ext>
+            </a:extLst>
+          </p:cNvPr>
+          <p:cNvPicPr>
+            <a:picLocks noChangeAspect="1"/>
+          </p:cNvPicPr>
+          <p:nvPr/>
+        </p:nvPicPr>
+        <p:blipFill>
+          <a:blip r:embed="rId3">
+            <a:extLst>
+              <a:ext uri="{28A0092B-C50C-407E-A947-70E740481C1C}">
+                <a14:useLocalDpi xmlns:a14="http://schemas.microsoft.com/office/drawing/2010/main" val="0"/>
+              </a:ext>
+            </a:extLst>
+          </a:blip>
+          <a:stretch>
+            <a:fillRect/>
+          </a:stretch>
+        </p:blipFill>
+        <p:spPr>
+          <a:xfrm>
+            <a:off x="21105" y="3989565"/>
+            <a:ext cx="3650936" cy="2323323"/>
+          </a:xfrm>
+          <a:prstGeom prst="rect">
+            <a:avLst/>
+          </a:prstGeom>
+        </p:spPr>
+      </p:pic>
+      <p:pic>
+        <p:nvPicPr>
+          <p:cNvPr id="7" name="Picture 6">
+            <a:extLst>
+              <a:ext uri="{FF2B5EF4-FFF2-40B4-BE49-F238E27FC236}">
+                <a16:creationId xmlns:a16="http://schemas.microsoft.com/office/drawing/2014/main" id="{D7157FCF-3259-4492-AF16-1B96AC8BFB1E}"/>
+              </a:ext>
+            </a:extLst>
+          </p:cNvPr>
+          <p:cNvPicPr>
+            <a:picLocks noChangeAspect="1"/>
+          </p:cNvPicPr>
+          <p:nvPr/>
+        </p:nvPicPr>
+        <p:blipFill>
+          <a:blip r:embed="rId4">
+            <a:extLst>
+              <a:ext uri="{28A0092B-C50C-407E-A947-70E740481C1C}">
+                <a14:useLocalDpi xmlns:a14="http://schemas.microsoft.com/office/drawing/2010/main" val="0"/>
+              </a:ext>
+            </a:extLst>
+          </a:blip>
+          <a:stretch>
+            <a:fillRect/>
+          </a:stretch>
+        </p:blipFill>
+        <p:spPr>
+          <a:xfrm>
+            <a:off x="7763070" y="3496233"/>
+            <a:ext cx="4287006" cy="2728095"/>
+          </a:xfrm>
+          <a:prstGeom prst="rect">
+            <a:avLst/>
+          </a:prstGeom>
+        </p:spPr>
+      </p:pic>
+      <p:pic>
+        <p:nvPicPr>
+          <p:cNvPr id="9" name="Picture 8">
+            <a:extLst>
+              <a:ext uri="{FF2B5EF4-FFF2-40B4-BE49-F238E27FC236}">
+                <a16:creationId xmlns:a16="http://schemas.microsoft.com/office/drawing/2014/main" id="{B8DB44A9-582F-45A1-8AFA-0368ED5F7DA0}"/>
+              </a:ext>
+            </a:extLst>
+          </p:cNvPr>
+          <p:cNvPicPr>
+            <a:picLocks noChangeAspect="1"/>
+          </p:cNvPicPr>
+          <p:nvPr/>
+        </p:nvPicPr>
+        <p:blipFill>
+          <a:blip r:embed="rId5">
+            <a:extLst>
+              <a:ext uri="{28A0092B-C50C-407E-A947-70E740481C1C}">
+                <a14:useLocalDpi xmlns:a14="http://schemas.microsoft.com/office/drawing/2010/main" val="0"/>
+              </a:ext>
+            </a:extLst>
+          </a:blip>
+          <a:stretch>
+            <a:fillRect/>
+          </a:stretch>
+        </p:blipFill>
+        <p:spPr>
+          <a:xfrm>
+            <a:off x="0" y="0"/>
+            <a:ext cx="4218548" cy="2684531"/>
+          </a:xfrm>
+          <a:prstGeom prst="rect">
+            <a:avLst/>
+          </a:prstGeom>
+        </p:spPr>
+      </p:pic>
+      <p:pic>
+        <p:nvPicPr>
+          <p:cNvPr id="11" name="Picture 10">
+            <a:extLst>
+              <a:ext uri="{FF2B5EF4-FFF2-40B4-BE49-F238E27FC236}">
+                <a16:creationId xmlns:a16="http://schemas.microsoft.com/office/drawing/2014/main" id="{B4FDEEB0-C308-48EF-80DA-6D5FA7D54CFC}"/>
+              </a:ext>
+            </a:extLst>
+          </p:cNvPr>
+          <p:cNvPicPr>
+            <a:picLocks noChangeAspect="1"/>
+          </p:cNvPicPr>
+          <p:nvPr/>
+        </p:nvPicPr>
+        <p:blipFill>
+          <a:blip r:embed="rId6">
+            <a:extLst>
+              <a:ext uri="{28A0092B-C50C-407E-A947-70E740481C1C}">
+                <a14:useLocalDpi xmlns:a14="http://schemas.microsoft.com/office/drawing/2010/main" val="0"/>
+              </a:ext>
+            </a:extLst>
+          </a:blip>
+          <a:stretch>
+            <a:fillRect/>
+          </a:stretch>
+        </p:blipFill>
+        <p:spPr>
+          <a:xfrm>
+            <a:off x="8283328" y="98596"/>
+            <a:ext cx="3908672" cy="2487337"/>
+          </a:xfrm>
+          <a:prstGeom prst="rect">
+            <a:avLst/>
+          </a:prstGeom>
+        </p:spPr>
+      </p:pic>
+    </p:spTree>
+    <p:extLst>
+      <p:ext uri="{BB962C8B-B14F-4D97-AF65-F5344CB8AC3E}">
+        <p14:creationId xmlns:p14="http://schemas.microsoft.com/office/powerpoint/2010/main" val="2273762078"/>
+      </p:ext>
+    </p:extLst>
+  </p:cSld>
+  <p:clrMapOvr>
+    <a:masterClrMapping/>
+  </p:clrMapOvr>
+</p:sld>
+</file>
+
+<file path=ppt/slides/slide29.xml><?xml version="1.0" encoding="utf-8"?>
+<p:sld xmlns:a="http://schemas.openxmlformats.org/drawingml/2006/main" xmlns:r="http://schemas.openxmlformats.org/officeDocument/2006/relationships" xmlns:p="http://schemas.openxmlformats.org/presentationml/2006/main">
+  <p:cSld>
+    <p:spTree>
+      <p:nvGrpSpPr>
+        <p:cNvPr id="1" name=""/>
+        <p:cNvGrpSpPr/>
+        <p:nvPr/>
+      </p:nvGrpSpPr>
+      <p:grpSpPr>
+        <a:xfrm>
+          <a:off x="0" y="0"/>
+          <a:ext cx="0" cy="0"/>
+          <a:chOff x="0" y="0"/>
+          <a:chExt cx="0" cy="0"/>
+        </a:xfrm>
+      </p:grpSpPr>
+      <p:pic>
+        <p:nvPicPr>
+          <p:cNvPr id="3" name="Picture 2">
+            <a:extLst>
+              <a:ext uri="{FF2B5EF4-FFF2-40B4-BE49-F238E27FC236}">
+                <a16:creationId xmlns:a16="http://schemas.microsoft.com/office/drawing/2014/main" id="{BA9CD272-8584-40F6-967F-456490370745}"/>
+              </a:ext>
+            </a:extLst>
+          </p:cNvPr>
+          <p:cNvPicPr>
+            <a:picLocks noChangeAspect="1"/>
+          </p:cNvPicPr>
+          <p:nvPr/>
+        </p:nvPicPr>
+        <p:blipFill>
+          <a:blip r:embed="rId2">
+            <a:extLst>
+              <a:ext uri="{28A0092B-C50C-407E-A947-70E740481C1C}">
+                <a14:useLocalDpi xmlns:a14="http://schemas.microsoft.com/office/drawing/2010/main" val="0"/>
+              </a:ext>
+            </a:extLst>
+          </a:blip>
+          <a:stretch>
+            <a:fillRect/>
+          </a:stretch>
+        </p:blipFill>
+        <p:spPr>
+          <a:xfrm>
+            <a:off x="4105469" y="2552052"/>
+            <a:ext cx="3850023" cy="2450015"/>
+          </a:xfrm>
+          <a:prstGeom prst="rect">
+            <a:avLst/>
+          </a:prstGeom>
+        </p:spPr>
+      </p:pic>
+      <p:pic>
+        <p:nvPicPr>
+          <p:cNvPr id="5" name="Picture 4">
+            <a:extLst>
+              <a:ext uri="{FF2B5EF4-FFF2-40B4-BE49-F238E27FC236}">
+                <a16:creationId xmlns:a16="http://schemas.microsoft.com/office/drawing/2014/main" id="{159F97B4-1984-4905-AF34-17ECCB254F6D}"/>
+              </a:ext>
+            </a:extLst>
+          </p:cNvPr>
+          <p:cNvPicPr>
+            <a:picLocks noChangeAspect="1"/>
+          </p:cNvPicPr>
+          <p:nvPr/>
+        </p:nvPicPr>
+        <p:blipFill>
+          <a:blip r:embed="rId3">
+            <a:extLst>
+              <a:ext uri="{28A0092B-C50C-407E-A947-70E740481C1C}">
+                <a14:useLocalDpi xmlns:a14="http://schemas.microsoft.com/office/drawing/2010/main" val="0"/>
+              </a:ext>
+            </a:extLst>
+          </a:blip>
+          <a:stretch>
+            <a:fillRect/>
+          </a:stretch>
+        </p:blipFill>
+        <p:spPr>
+          <a:xfrm>
+            <a:off x="104601" y="3982333"/>
+            <a:ext cx="3926224" cy="2498506"/>
+          </a:xfrm>
+          <a:prstGeom prst="rect">
+            <a:avLst/>
+          </a:prstGeom>
+        </p:spPr>
+      </p:pic>
+      <p:pic>
+        <p:nvPicPr>
+          <p:cNvPr id="7" name="Picture 6">
+            <a:extLst>
+              <a:ext uri="{FF2B5EF4-FFF2-40B4-BE49-F238E27FC236}">
+                <a16:creationId xmlns:a16="http://schemas.microsoft.com/office/drawing/2014/main" id="{7822DE05-96EA-4413-B025-6A681EF09239}"/>
+              </a:ext>
+            </a:extLst>
+          </p:cNvPr>
+          <p:cNvPicPr>
+            <a:picLocks noChangeAspect="1"/>
+          </p:cNvPicPr>
+          <p:nvPr/>
+        </p:nvPicPr>
+        <p:blipFill>
+          <a:blip r:embed="rId4">
+            <a:extLst>
+              <a:ext uri="{28A0092B-C50C-407E-A947-70E740481C1C}">
+                <a14:useLocalDpi xmlns:a14="http://schemas.microsoft.com/office/drawing/2010/main" val="0"/>
+              </a:ext>
+            </a:extLst>
+          </a:blip>
+          <a:stretch>
+            <a:fillRect/>
+          </a:stretch>
+        </p:blipFill>
+        <p:spPr>
+          <a:xfrm>
+            <a:off x="7955492" y="3767468"/>
+            <a:ext cx="4131907" cy="2629395"/>
+          </a:xfrm>
+          <a:prstGeom prst="rect">
+            <a:avLst/>
+          </a:prstGeom>
+        </p:spPr>
+      </p:pic>
+      <p:pic>
+        <p:nvPicPr>
+          <p:cNvPr id="9" name="Picture 8">
+            <a:extLst>
+              <a:ext uri="{FF2B5EF4-FFF2-40B4-BE49-F238E27FC236}">
+                <a16:creationId xmlns:a16="http://schemas.microsoft.com/office/drawing/2014/main" id="{CA85A813-305F-451A-B78C-83BF489CDD4C}"/>
+              </a:ext>
+            </a:extLst>
+          </p:cNvPr>
+          <p:cNvPicPr>
+            <a:picLocks noChangeAspect="1"/>
+          </p:cNvPicPr>
+          <p:nvPr/>
+        </p:nvPicPr>
+        <p:blipFill>
+          <a:blip r:embed="rId5">
+            <a:extLst>
+              <a:ext uri="{28A0092B-C50C-407E-A947-70E740481C1C}">
+                <a14:useLocalDpi xmlns:a14="http://schemas.microsoft.com/office/drawing/2010/main" val="0"/>
+              </a:ext>
+            </a:extLst>
+          </a:blip>
+          <a:stretch>
+            <a:fillRect/>
+          </a:stretch>
+        </p:blipFill>
+        <p:spPr>
+          <a:xfrm>
+            <a:off x="0" y="52427"/>
+            <a:ext cx="4436520" cy="2823240"/>
+          </a:xfrm>
+          <a:prstGeom prst="rect">
+            <a:avLst/>
+          </a:prstGeom>
+        </p:spPr>
+      </p:pic>
+      <p:pic>
+        <p:nvPicPr>
+          <p:cNvPr id="11" name="Picture 10">
+            <a:extLst>
+              <a:ext uri="{FF2B5EF4-FFF2-40B4-BE49-F238E27FC236}">
+                <a16:creationId xmlns:a16="http://schemas.microsoft.com/office/drawing/2014/main" id="{E6DF719B-228A-4B86-956F-0761D4814CD7}"/>
+              </a:ext>
+            </a:extLst>
+          </p:cNvPr>
+          <p:cNvPicPr>
+            <a:picLocks noChangeAspect="1"/>
+          </p:cNvPicPr>
+          <p:nvPr/>
+        </p:nvPicPr>
+        <p:blipFill>
+          <a:blip r:embed="rId6">
+            <a:extLst>
+              <a:ext uri="{28A0092B-C50C-407E-A947-70E740481C1C}">
+                <a14:useLocalDpi xmlns:a14="http://schemas.microsoft.com/office/drawing/2010/main" val="0"/>
+              </a:ext>
+            </a:extLst>
+          </a:blip>
+          <a:stretch>
+            <a:fillRect/>
+          </a:stretch>
+        </p:blipFill>
+        <p:spPr>
+          <a:xfrm>
+            <a:off x="7890328" y="33765"/>
+            <a:ext cx="4301671" cy="2737427"/>
+          </a:xfrm>
+          <a:prstGeom prst="rect">
+            <a:avLst/>
+          </a:prstGeom>
+        </p:spPr>
+      </p:pic>
+    </p:spTree>
+    <p:extLst>
+      <p:ext uri="{BB962C8B-B14F-4D97-AF65-F5344CB8AC3E}">
+        <p14:creationId xmlns:p14="http://schemas.microsoft.com/office/powerpoint/2010/main" val="2876282919"/>
+      </p:ext>
+    </p:extLst>
+  </p:cSld>
+  <p:clrMapOvr>
+    <a:masterClrMapping/>
+  </p:clrMapOvr>
+</p:sld>
+</file>
+
 <file path=ppt/slides/slide3.xml><?xml version="1.0" encoding="utf-8"?>
 <p:sld xmlns:a="http://schemas.openxmlformats.org/drawingml/2006/main" xmlns:r="http://schemas.openxmlformats.org/officeDocument/2006/relationships" xmlns:p="http://schemas.openxmlformats.org/presentationml/2006/main">
   <p:cSld>
@@ -6956,6 +8877,844 @@
     <p:extLst>
       <p:ext uri="{BB962C8B-B14F-4D97-AF65-F5344CB8AC3E}">
         <p14:creationId xmlns:p14="http://schemas.microsoft.com/office/powerpoint/2010/main" val="2139632845"/>
+      </p:ext>
+    </p:extLst>
+  </p:cSld>
+  <p:clrMapOvr>
+    <a:masterClrMapping/>
+  </p:clrMapOvr>
+</p:sld>
+</file>
+
+<file path=ppt/slides/slide30.xml><?xml version="1.0" encoding="utf-8"?>
+<p:sld xmlns:a="http://schemas.openxmlformats.org/drawingml/2006/main" xmlns:r="http://schemas.openxmlformats.org/officeDocument/2006/relationships" xmlns:p="http://schemas.openxmlformats.org/presentationml/2006/main">
+  <p:cSld>
+    <p:spTree>
+      <p:nvGrpSpPr>
+        <p:cNvPr id="1" name=""/>
+        <p:cNvGrpSpPr/>
+        <p:nvPr/>
+      </p:nvGrpSpPr>
+      <p:grpSpPr>
+        <a:xfrm>
+          <a:off x="0" y="0"/>
+          <a:ext cx="0" cy="0"/>
+          <a:chOff x="0" y="0"/>
+          <a:chExt cx="0" cy="0"/>
+        </a:xfrm>
+      </p:grpSpPr>
+      <p:sp>
+        <p:nvSpPr>
+          <p:cNvPr id="5" name="TextBox 4">
+            <a:extLst>
+              <a:ext uri="{FF2B5EF4-FFF2-40B4-BE49-F238E27FC236}">
+                <a16:creationId xmlns:a16="http://schemas.microsoft.com/office/drawing/2014/main" id="{5E17846F-F836-4707-BD98-4FAE5FC071FE}"/>
+              </a:ext>
+            </a:extLst>
+          </p:cNvPr>
+          <p:cNvSpPr txBox="1"/>
+          <p:nvPr/>
+        </p:nvSpPr>
+        <p:spPr>
+          <a:xfrm flipH="1">
+            <a:off x="2005147" y="1035700"/>
+            <a:ext cx="9443514" cy="830997"/>
+          </a:xfrm>
+          <a:prstGeom prst="rect">
+            <a:avLst/>
+          </a:prstGeom>
+          <a:noFill/>
+        </p:spPr>
+        <p:txBody>
+          <a:bodyPr wrap="square" rtlCol="0">
+            <a:spAutoFit/>
+          </a:bodyPr>
+          <a:lstStyle/>
+          <a:p>
+            <a:r>
+              <a:rPr lang="en-IN" sz="4800" dirty="0"/>
+              <a:t>Single User Different  Action Analysis</a:t>
+            </a:r>
+          </a:p>
+        </p:txBody>
+      </p:sp>
+      <p:sp>
+        <p:nvSpPr>
+          <p:cNvPr id="6" name="TextBox 5">
+            <a:extLst>
+              <a:ext uri="{FF2B5EF4-FFF2-40B4-BE49-F238E27FC236}">
+                <a16:creationId xmlns:a16="http://schemas.microsoft.com/office/drawing/2014/main" id="{0D33C595-A1BD-433C-A1F3-FFED68CB76E5}"/>
+              </a:ext>
+            </a:extLst>
+          </p:cNvPr>
+          <p:cNvSpPr txBox="1"/>
+          <p:nvPr/>
+        </p:nvSpPr>
+        <p:spPr>
+          <a:xfrm>
+            <a:off x="3571875" y="2095500"/>
+            <a:ext cx="3385863" cy="369332"/>
+          </a:xfrm>
+          <a:prstGeom prst="rect">
+            <a:avLst/>
+          </a:prstGeom>
+          <a:noFill/>
+        </p:spPr>
+        <p:txBody>
+          <a:bodyPr wrap="none" rtlCol="0">
+            <a:spAutoFit/>
+          </a:bodyPr>
+          <a:lstStyle/>
+          <a:p>
+            <a:r>
+              <a:rPr lang="en-IN" dirty="0"/>
+              <a:t>First Trial Of Each Action is plotted</a:t>
+            </a:r>
+          </a:p>
+        </p:txBody>
+      </p:sp>
+    </p:spTree>
+    <p:extLst>
+      <p:ext uri="{BB962C8B-B14F-4D97-AF65-F5344CB8AC3E}">
+        <p14:creationId xmlns:p14="http://schemas.microsoft.com/office/powerpoint/2010/main" val="4080135499"/>
+      </p:ext>
+    </p:extLst>
+  </p:cSld>
+  <p:clrMapOvr>
+    <a:masterClrMapping/>
+  </p:clrMapOvr>
+</p:sld>
+</file>
+
+<file path=ppt/slides/slide31.xml><?xml version="1.0" encoding="utf-8"?>
+<p:sld xmlns:a="http://schemas.openxmlformats.org/drawingml/2006/main" xmlns:r="http://schemas.openxmlformats.org/officeDocument/2006/relationships" xmlns:p="http://schemas.openxmlformats.org/presentationml/2006/main">
+  <p:cSld>
+    <p:spTree>
+      <p:nvGrpSpPr>
+        <p:cNvPr id="1" name=""/>
+        <p:cNvGrpSpPr/>
+        <p:nvPr/>
+      </p:nvGrpSpPr>
+      <p:grpSpPr>
+        <a:xfrm>
+          <a:off x="0" y="0"/>
+          <a:ext cx="0" cy="0"/>
+          <a:chOff x="0" y="0"/>
+          <a:chExt cx="0" cy="0"/>
+        </a:xfrm>
+      </p:grpSpPr>
+      <p:pic>
+        <p:nvPicPr>
+          <p:cNvPr id="31" name="Picture 30">
+            <a:extLst>
+              <a:ext uri="{FF2B5EF4-FFF2-40B4-BE49-F238E27FC236}">
+                <a16:creationId xmlns:a16="http://schemas.microsoft.com/office/drawing/2014/main" id="{04F4C4B9-4CD2-4A67-86CF-CAA686611770}"/>
+              </a:ext>
+            </a:extLst>
+          </p:cNvPr>
+          <p:cNvPicPr>
+            <a:picLocks noChangeAspect="1"/>
+          </p:cNvPicPr>
+          <p:nvPr/>
+        </p:nvPicPr>
+        <p:blipFill>
+          <a:blip r:embed="rId2">
+            <a:extLst>
+              <a:ext uri="{28A0092B-C50C-407E-A947-70E740481C1C}">
+                <a14:useLocalDpi xmlns:a14="http://schemas.microsoft.com/office/drawing/2010/main" val="0"/>
+              </a:ext>
+            </a:extLst>
+          </a:blip>
+          <a:stretch>
+            <a:fillRect/>
+          </a:stretch>
+        </p:blipFill>
+        <p:spPr>
+          <a:xfrm>
+            <a:off x="70812" y="3214103"/>
+            <a:ext cx="4204967" cy="3102722"/>
+          </a:xfrm>
+          <a:prstGeom prst="rect">
+            <a:avLst/>
+          </a:prstGeom>
+        </p:spPr>
+      </p:pic>
+      <p:pic>
+        <p:nvPicPr>
+          <p:cNvPr id="17" name="Picture 16">
+            <a:extLst>
+              <a:ext uri="{FF2B5EF4-FFF2-40B4-BE49-F238E27FC236}">
+                <a16:creationId xmlns:a16="http://schemas.microsoft.com/office/drawing/2014/main" id="{8068D089-C665-41EE-9951-45277ECA5C01}"/>
+              </a:ext>
+            </a:extLst>
+          </p:cNvPr>
+          <p:cNvPicPr>
+            <a:picLocks noChangeAspect="1"/>
+          </p:cNvPicPr>
+          <p:nvPr/>
+        </p:nvPicPr>
+        <p:blipFill>
+          <a:blip r:embed="rId3">
+            <a:extLst>
+              <a:ext uri="{28A0092B-C50C-407E-A947-70E740481C1C}">
+                <a14:useLocalDpi xmlns:a14="http://schemas.microsoft.com/office/drawing/2010/main" val="0"/>
+              </a:ext>
+            </a:extLst>
+          </a:blip>
+          <a:stretch>
+            <a:fillRect/>
+          </a:stretch>
+        </p:blipFill>
+        <p:spPr>
+          <a:xfrm>
+            <a:off x="7716900" y="3177969"/>
+            <a:ext cx="4510554" cy="3082762"/>
+          </a:xfrm>
+          <a:prstGeom prst="rect">
+            <a:avLst/>
+          </a:prstGeom>
+        </p:spPr>
+      </p:pic>
+      <p:pic>
+        <p:nvPicPr>
+          <p:cNvPr id="19" name="Picture 18">
+            <a:extLst>
+              <a:ext uri="{FF2B5EF4-FFF2-40B4-BE49-F238E27FC236}">
+                <a16:creationId xmlns:a16="http://schemas.microsoft.com/office/drawing/2014/main" id="{F86EE0EE-106E-41C9-A4CA-D8020B53E94D}"/>
+              </a:ext>
+            </a:extLst>
+          </p:cNvPr>
+          <p:cNvPicPr>
+            <a:picLocks noChangeAspect="1"/>
+          </p:cNvPicPr>
+          <p:nvPr/>
+        </p:nvPicPr>
+        <p:blipFill>
+          <a:blip r:embed="rId4">
+            <a:extLst>
+              <a:ext uri="{28A0092B-C50C-407E-A947-70E740481C1C}">
+                <a14:useLocalDpi xmlns:a14="http://schemas.microsoft.com/office/drawing/2010/main" val="0"/>
+              </a:ext>
+            </a:extLst>
+          </a:blip>
+          <a:stretch>
+            <a:fillRect/>
+          </a:stretch>
+        </p:blipFill>
+        <p:spPr>
+          <a:xfrm>
+            <a:off x="46655" y="-22031"/>
+            <a:ext cx="3904375" cy="3158617"/>
+          </a:xfrm>
+          <a:prstGeom prst="rect">
+            <a:avLst/>
+          </a:prstGeom>
+        </p:spPr>
+      </p:pic>
+      <p:pic>
+        <p:nvPicPr>
+          <p:cNvPr id="27" name="Picture 26">
+            <a:extLst>
+              <a:ext uri="{FF2B5EF4-FFF2-40B4-BE49-F238E27FC236}">
+                <a16:creationId xmlns:a16="http://schemas.microsoft.com/office/drawing/2014/main" id="{7290FCAE-BFF9-496B-A0ED-7D248B1C382B}"/>
+              </a:ext>
+            </a:extLst>
+          </p:cNvPr>
+          <p:cNvPicPr>
+            <a:picLocks noChangeAspect="1"/>
+          </p:cNvPicPr>
+          <p:nvPr/>
+        </p:nvPicPr>
+        <p:blipFill>
+          <a:blip r:embed="rId5">
+            <a:extLst>
+              <a:ext uri="{28A0092B-C50C-407E-A947-70E740481C1C}">
+                <a14:useLocalDpi xmlns:a14="http://schemas.microsoft.com/office/drawing/2010/main" val="0"/>
+              </a:ext>
+            </a:extLst>
+          </a:blip>
+          <a:stretch>
+            <a:fillRect/>
+          </a:stretch>
+        </p:blipFill>
+        <p:spPr>
+          <a:xfrm>
+            <a:off x="8128637" y="-18662"/>
+            <a:ext cx="4098817" cy="3060040"/>
+          </a:xfrm>
+          <a:prstGeom prst="rect">
+            <a:avLst/>
+          </a:prstGeom>
+        </p:spPr>
+      </p:pic>
+      <p:pic>
+        <p:nvPicPr>
+          <p:cNvPr id="23" name="Picture 22">
+            <a:extLst>
+              <a:ext uri="{FF2B5EF4-FFF2-40B4-BE49-F238E27FC236}">
+                <a16:creationId xmlns:a16="http://schemas.microsoft.com/office/drawing/2014/main" id="{A0E0B292-15A7-401A-AA96-0695053A458F}"/>
+              </a:ext>
+            </a:extLst>
+          </p:cNvPr>
+          <p:cNvPicPr>
+            <a:picLocks noChangeAspect="1"/>
+          </p:cNvPicPr>
+          <p:nvPr/>
+        </p:nvPicPr>
+        <p:blipFill>
+          <a:blip r:embed="rId6">
+            <a:extLst>
+              <a:ext uri="{28A0092B-C50C-407E-A947-70E740481C1C}">
+                <a14:useLocalDpi xmlns:a14="http://schemas.microsoft.com/office/drawing/2010/main" val="0"/>
+              </a:ext>
+            </a:extLst>
+          </a:blip>
+          <a:stretch>
+            <a:fillRect/>
+          </a:stretch>
+        </p:blipFill>
+        <p:spPr>
+          <a:xfrm>
+            <a:off x="3800672" y="1"/>
+            <a:ext cx="4478324" cy="3082762"/>
+          </a:xfrm>
+          <a:prstGeom prst="rect">
+            <a:avLst/>
+          </a:prstGeom>
+        </p:spPr>
+      </p:pic>
+      <p:pic>
+        <p:nvPicPr>
+          <p:cNvPr id="37" name="Picture 36">
+            <a:extLst>
+              <a:ext uri="{FF2B5EF4-FFF2-40B4-BE49-F238E27FC236}">
+                <a16:creationId xmlns:a16="http://schemas.microsoft.com/office/drawing/2014/main" id="{8FCC7D93-543A-4A1F-BCDE-174D2C5F3009}"/>
+              </a:ext>
+            </a:extLst>
+          </p:cNvPr>
+          <p:cNvPicPr>
+            <a:picLocks noChangeAspect="1"/>
+          </p:cNvPicPr>
+          <p:nvPr/>
+        </p:nvPicPr>
+        <p:blipFill>
+          <a:blip r:embed="rId7">
+            <a:extLst>
+              <a:ext uri="{28A0092B-C50C-407E-A947-70E740481C1C}">
+                <a14:useLocalDpi xmlns:a14="http://schemas.microsoft.com/office/drawing/2010/main" val="0"/>
+              </a:ext>
+            </a:extLst>
+          </a:blip>
+          <a:stretch>
+            <a:fillRect/>
+          </a:stretch>
+        </p:blipFill>
+        <p:spPr>
+          <a:xfrm>
+            <a:off x="3993516" y="3136586"/>
+            <a:ext cx="4204968" cy="3198213"/>
+          </a:xfrm>
+          <a:prstGeom prst="rect">
+            <a:avLst/>
+          </a:prstGeom>
+        </p:spPr>
+      </p:pic>
+    </p:spTree>
+    <p:extLst>
+      <p:ext uri="{BB962C8B-B14F-4D97-AF65-F5344CB8AC3E}">
+        <p14:creationId xmlns:p14="http://schemas.microsoft.com/office/powerpoint/2010/main" val="3890779985"/>
+      </p:ext>
+    </p:extLst>
+  </p:cSld>
+  <p:clrMapOvr>
+    <a:masterClrMapping/>
+  </p:clrMapOvr>
+</p:sld>
+</file>
+
+<file path=ppt/slides/slide32.xml><?xml version="1.0" encoding="utf-8"?>
+<p:sld xmlns:a="http://schemas.openxmlformats.org/drawingml/2006/main" xmlns:r="http://schemas.openxmlformats.org/officeDocument/2006/relationships" xmlns:p="http://schemas.openxmlformats.org/presentationml/2006/main">
+  <p:cSld>
+    <p:spTree>
+      <p:nvGrpSpPr>
+        <p:cNvPr id="1" name=""/>
+        <p:cNvGrpSpPr/>
+        <p:nvPr/>
+      </p:nvGrpSpPr>
+      <p:grpSpPr>
+        <a:xfrm>
+          <a:off x="0" y="0"/>
+          <a:ext cx="0" cy="0"/>
+          <a:chOff x="0" y="0"/>
+          <a:chExt cx="0" cy="0"/>
+        </a:xfrm>
+      </p:grpSpPr>
+      <p:pic>
+        <p:nvPicPr>
+          <p:cNvPr id="5" name="Picture 4">
+            <a:extLst>
+              <a:ext uri="{FF2B5EF4-FFF2-40B4-BE49-F238E27FC236}">
+                <a16:creationId xmlns:a16="http://schemas.microsoft.com/office/drawing/2014/main" id="{AF0D544D-E340-4B28-9D5C-22EC73B2E97C}"/>
+              </a:ext>
+            </a:extLst>
+          </p:cNvPr>
+          <p:cNvPicPr>
+            <a:picLocks noChangeAspect="1"/>
+          </p:cNvPicPr>
+          <p:nvPr/>
+        </p:nvPicPr>
+        <p:blipFill>
+          <a:blip r:embed="rId2">
+            <a:extLst>
+              <a:ext uri="{28A0092B-C50C-407E-A947-70E740481C1C}">
+                <a14:useLocalDpi xmlns:a14="http://schemas.microsoft.com/office/drawing/2010/main" val="0"/>
+              </a:ext>
+            </a:extLst>
+          </a:blip>
+          <a:stretch>
+            <a:fillRect/>
+          </a:stretch>
+        </p:blipFill>
+        <p:spPr>
+          <a:xfrm>
+            <a:off x="3110" y="115903"/>
+            <a:ext cx="3659414" cy="2328718"/>
+          </a:xfrm>
+          <a:prstGeom prst="rect">
+            <a:avLst/>
+          </a:prstGeom>
+        </p:spPr>
+      </p:pic>
+      <p:pic>
+        <p:nvPicPr>
+          <p:cNvPr id="7" name="Picture 6">
+            <a:extLst>
+              <a:ext uri="{FF2B5EF4-FFF2-40B4-BE49-F238E27FC236}">
+                <a16:creationId xmlns:a16="http://schemas.microsoft.com/office/drawing/2014/main" id="{80350DED-BB47-4960-AFF0-5EFAB0F00192}"/>
+              </a:ext>
+            </a:extLst>
+          </p:cNvPr>
+          <p:cNvPicPr>
+            <a:picLocks noChangeAspect="1"/>
+          </p:cNvPicPr>
+          <p:nvPr/>
+        </p:nvPicPr>
+        <p:blipFill>
+          <a:blip r:embed="rId3">
+            <a:extLst>
+              <a:ext uri="{28A0092B-C50C-407E-A947-70E740481C1C}">
+                <a14:useLocalDpi xmlns:a14="http://schemas.microsoft.com/office/drawing/2010/main" val="0"/>
+              </a:ext>
+            </a:extLst>
+          </a:blip>
+          <a:stretch>
+            <a:fillRect/>
+          </a:stretch>
+        </p:blipFill>
+        <p:spPr>
+          <a:xfrm>
+            <a:off x="3806890" y="-9331"/>
+            <a:ext cx="4348066" cy="2537927"/>
+          </a:xfrm>
+          <a:prstGeom prst="rect">
+            <a:avLst/>
+          </a:prstGeom>
+        </p:spPr>
+      </p:pic>
+      <p:pic>
+        <p:nvPicPr>
+          <p:cNvPr id="9" name="Picture 8">
+            <a:extLst>
+              <a:ext uri="{FF2B5EF4-FFF2-40B4-BE49-F238E27FC236}">
+                <a16:creationId xmlns:a16="http://schemas.microsoft.com/office/drawing/2014/main" id="{B695A0C9-63C5-49BC-AEF9-A65365693E06}"/>
+              </a:ext>
+            </a:extLst>
+          </p:cNvPr>
+          <p:cNvPicPr>
+            <a:picLocks noChangeAspect="1"/>
+          </p:cNvPicPr>
+          <p:nvPr/>
+        </p:nvPicPr>
+        <p:blipFill>
+          <a:blip r:embed="rId4">
+            <a:extLst>
+              <a:ext uri="{28A0092B-C50C-407E-A947-70E740481C1C}">
+                <a14:useLocalDpi xmlns:a14="http://schemas.microsoft.com/office/drawing/2010/main" val="0"/>
+              </a:ext>
+            </a:extLst>
+          </a:blip>
+          <a:stretch>
+            <a:fillRect/>
+          </a:stretch>
+        </p:blipFill>
+        <p:spPr>
+          <a:xfrm>
+            <a:off x="7959012" y="75835"/>
+            <a:ext cx="3661856" cy="2330272"/>
+          </a:xfrm>
+          <a:prstGeom prst="rect">
+            <a:avLst/>
+          </a:prstGeom>
+        </p:spPr>
+      </p:pic>
+      <p:pic>
+        <p:nvPicPr>
+          <p:cNvPr id="11" name="Picture 10">
+            <a:extLst>
+              <a:ext uri="{FF2B5EF4-FFF2-40B4-BE49-F238E27FC236}">
+                <a16:creationId xmlns:a16="http://schemas.microsoft.com/office/drawing/2014/main" id="{B8778447-3DEA-444A-91CA-6540B9568CB8}"/>
+              </a:ext>
+            </a:extLst>
+          </p:cNvPr>
+          <p:cNvPicPr>
+            <a:picLocks noChangeAspect="1"/>
+          </p:cNvPicPr>
+          <p:nvPr/>
+        </p:nvPicPr>
+        <p:blipFill>
+          <a:blip r:embed="rId5">
+            <a:extLst>
+              <a:ext uri="{28A0092B-C50C-407E-A947-70E740481C1C}">
+                <a14:useLocalDpi xmlns:a14="http://schemas.microsoft.com/office/drawing/2010/main" val="0"/>
+              </a:ext>
+            </a:extLst>
+          </a:blip>
+          <a:stretch>
+            <a:fillRect/>
+          </a:stretch>
+        </p:blipFill>
+        <p:spPr>
+          <a:xfrm>
+            <a:off x="0" y="3975546"/>
+            <a:ext cx="3819590" cy="2430648"/>
+          </a:xfrm>
+          <a:prstGeom prst="rect">
+            <a:avLst/>
+          </a:prstGeom>
+        </p:spPr>
+      </p:pic>
+      <p:pic>
+        <p:nvPicPr>
+          <p:cNvPr id="13" name="Picture 12">
+            <a:extLst>
+              <a:ext uri="{FF2B5EF4-FFF2-40B4-BE49-F238E27FC236}">
+                <a16:creationId xmlns:a16="http://schemas.microsoft.com/office/drawing/2014/main" id="{46B49DA1-37DD-4930-9BB2-73EBA469F522}"/>
+              </a:ext>
+            </a:extLst>
+          </p:cNvPr>
+          <p:cNvPicPr>
+            <a:picLocks noChangeAspect="1"/>
+          </p:cNvPicPr>
+          <p:nvPr/>
+        </p:nvPicPr>
+        <p:blipFill>
+          <a:blip r:embed="rId6">
+            <a:extLst>
+              <a:ext uri="{28A0092B-C50C-407E-A947-70E740481C1C}">
+                <a14:useLocalDpi xmlns:a14="http://schemas.microsoft.com/office/drawing/2010/main" val="0"/>
+              </a:ext>
+            </a:extLst>
+          </a:blip>
+          <a:stretch>
+            <a:fillRect/>
+          </a:stretch>
+        </p:blipFill>
+        <p:spPr>
+          <a:xfrm>
+            <a:off x="3806890" y="4075921"/>
+            <a:ext cx="4152122" cy="2330273"/>
+          </a:xfrm>
+          <a:prstGeom prst="rect">
+            <a:avLst/>
+          </a:prstGeom>
+        </p:spPr>
+      </p:pic>
+      <p:pic>
+        <p:nvPicPr>
+          <p:cNvPr id="15" name="Picture 14">
+            <a:extLst>
+              <a:ext uri="{FF2B5EF4-FFF2-40B4-BE49-F238E27FC236}">
+                <a16:creationId xmlns:a16="http://schemas.microsoft.com/office/drawing/2014/main" id="{424192B7-EBD8-4269-815B-379CD671FB6E}"/>
+              </a:ext>
+            </a:extLst>
+          </p:cNvPr>
+          <p:cNvPicPr>
+            <a:picLocks noChangeAspect="1"/>
+          </p:cNvPicPr>
+          <p:nvPr/>
+        </p:nvPicPr>
+        <p:blipFill>
+          <a:blip r:embed="rId7">
+            <a:extLst>
+              <a:ext uri="{28A0092B-C50C-407E-A947-70E740481C1C}">
+                <a14:useLocalDpi xmlns:a14="http://schemas.microsoft.com/office/drawing/2010/main" val="0"/>
+              </a:ext>
+            </a:extLst>
+          </a:blip>
+          <a:stretch>
+            <a:fillRect/>
+          </a:stretch>
+        </p:blipFill>
+        <p:spPr>
+          <a:xfrm>
+            <a:off x="8182726" y="3909527"/>
+            <a:ext cx="3923333" cy="2496667"/>
+          </a:xfrm>
+          <a:prstGeom prst="rect">
+            <a:avLst/>
+          </a:prstGeom>
+        </p:spPr>
+      </p:pic>
+    </p:spTree>
+    <p:extLst>
+      <p:ext uri="{BB962C8B-B14F-4D97-AF65-F5344CB8AC3E}">
+        <p14:creationId xmlns:p14="http://schemas.microsoft.com/office/powerpoint/2010/main" val="2486417075"/>
+      </p:ext>
+    </p:extLst>
+  </p:cSld>
+  <p:clrMapOvr>
+    <a:masterClrMapping/>
+  </p:clrMapOvr>
+</p:sld>
+</file>
+
+<file path=ppt/slides/slide33.xml><?xml version="1.0" encoding="utf-8"?>
+<p:sld xmlns:a="http://schemas.openxmlformats.org/drawingml/2006/main" xmlns:r="http://schemas.openxmlformats.org/officeDocument/2006/relationships" xmlns:p="http://schemas.openxmlformats.org/presentationml/2006/main">
+  <p:cSld>
+    <p:spTree>
+      <p:nvGrpSpPr>
+        <p:cNvPr id="1" name=""/>
+        <p:cNvGrpSpPr/>
+        <p:nvPr/>
+      </p:nvGrpSpPr>
+      <p:grpSpPr>
+        <a:xfrm>
+          <a:off x="0" y="0"/>
+          <a:ext cx="0" cy="0"/>
+          <a:chOff x="0" y="0"/>
+          <a:chExt cx="0" cy="0"/>
+        </a:xfrm>
+      </p:grpSpPr>
+      <p:pic>
+        <p:nvPicPr>
+          <p:cNvPr id="3" name="Picture 2">
+            <a:extLst>
+              <a:ext uri="{FF2B5EF4-FFF2-40B4-BE49-F238E27FC236}">
+                <a16:creationId xmlns:a16="http://schemas.microsoft.com/office/drawing/2014/main" id="{76031B1B-83A7-4349-96E7-5BBD76BF13AF}"/>
+              </a:ext>
+            </a:extLst>
+          </p:cNvPr>
+          <p:cNvPicPr>
+            <a:picLocks noChangeAspect="1"/>
+          </p:cNvPicPr>
+          <p:nvPr/>
+        </p:nvPicPr>
+        <p:blipFill>
+          <a:blip r:embed="rId2">
+            <a:extLst>
+              <a:ext uri="{28A0092B-C50C-407E-A947-70E740481C1C}">
+                <a14:useLocalDpi xmlns:a14="http://schemas.microsoft.com/office/drawing/2010/main" val="0"/>
+              </a:ext>
+            </a:extLst>
+          </a:blip>
+          <a:stretch>
+            <a:fillRect/>
+          </a:stretch>
+        </p:blipFill>
+        <p:spPr>
+          <a:xfrm>
+            <a:off x="0" y="69250"/>
+            <a:ext cx="4156378" cy="2644968"/>
+          </a:xfrm>
+          <a:prstGeom prst="rect">
+            <a:avLst/>
+          </a:prstGeom>
+        </p:spPr>
+      </p:pic>
+      <p:pic>
+        <p:nvPicPr>
+          <p:cNvPr id="5" name="Picture 4">
+            <a:extLst>
+              <a:ext uri="{FF2B5EF4-FFF2-40B4-BE49-F238E27FC236}">
+                <a16:creationId xmlns:a16="http://schemas.microsoft.com/office/drawing/2014/main" id="{0A42C256-019F-45DE-AF5D-DB61B3EBB09F}"/>
+              </a:ext>
+            </a:extLst>
+          </p:cNvPr>
+          <p:cNvPicPr>
+            <a:picLocks noChangeAspect="1"/>
+          </p:cNvPicPr>
+          <p:nvPr/>
+        </p:nvPicPr>
+        <p:blipFill>
+          <a:blip r:embed="rId3">
+            <a:extLst>
+              <a:ext uri="{28A0092B-C50C-407E-A947-70E740481C1C}">
+                <a14:useLocalDpi xmlns:a14="http://schemas.microsoft.com/office/drawing/2010/main" val="0"/>
+              </a:ext>
+            </a:extLst>
+          </a:blip>
+          <a:stretch>
+            <a:fillRect/>
+          </a:stretch>
+        </p:blipFill>
+        <p:spPr>
+          <a:xfrm>
+            <a:off x="4017811" y="69250"/>
+            <a:ext cx="4156378" cy="2644968"/>
+          </a:xfrm>
+          <a:prstGeom prst="rect">
+            <a:avLst/>
+          </a:prstGeom>
+        </p:spPr>
+      </p:pic>
+      <p:pic>
+        <p:nvPicPr>
+          <p:cNvPr id="7" name="Picture 6">
+            <a:extLst>
+              <a:ext uri="{FF2B5EF4-FFF2-40B4-BE49-F238E27FC236}">
+                <a16:creationId xmlns:a16="http://schemas.microsoft.com/office/drawing/2014/main" id="{4FE027AB-1DC8-421B-A6BE-3C9988481322}"/>
+              </a:ext>
+            </a:extLst>
+          </p:cNvPr>
+          <p:cNvPicPr>
+            <a:picLocks noChangeAspect="1"/>
+          </p:cNvPicPr>
+          <p:nvPr/>
+        </p:nvPicPr>
+        <p:blipFill>
+          <a:blip r:embed="rId4">
+            <a:extLst>
+              <a:ext uri="{28A0092B-C50C-407E-A947-70E740481C1C}">
+                <a14:useLocalDpi xmlns:a14="http://schemas.microsoft.com/office/drawing/2010/main" val="0"/>
+              </a:ext>
+            </a:extLst>
+          </a:blip>
+          <a:stretch>
+            <a:fillRect/>
+          </a:stretch>
+        </p:blipFill>
+        <p:spPr>
+          <a:xfrm>
+            <a:off x="8035624" y="69250"/>
+            <a:ext cx="4156379" cy="2644968"/>
+          </a:xfrm>
+          <a:prstGeom prst="rect">
+            <a:avLst/>
+          </a:prstGeom>
+        </p:spPr>
+      </p:pic>
+      <p:pic>
+        <p:nvPicPr>
+          <p:cNvPr id="9" name="Picture 8">
+            <a:extLst>
+              <a:ext uri="{FF2B5EF4-FFF2-40B4-BE49-F238E27FC236}">
+                <a16:creationId xmlns:a16="http://schemas.microsoft.com/office/drawing/2014/main" id="{E9109CBC-0264-4E8A-9099-81F581E5036A}"/>
+              </a:ext>
+            </a:extLst>
+          </p:cNvPr>
+          <p:cNvPicPr>
+            <a:picLocks noChangeAspect="1"/>
+          </p:cNvPicPr>
+          <p:nvPr/>
+        </p:nvPicPr>
+        <p:blipFill>
+          <a:blip r:embed="rId5">
+            <a:extLst>
+              <a:ext uri="{28A0092B-C50C-407E-A947-70E740481C1C}">
+                <a14:useLocalDpi xmlns:a14="http://schemas.microsoft.com/office/drawing/2010/main" val="0"/>
+              </a:ext>
+            </a:extLst>
+          </a:blip>
+          <a:stretch>
+            <a:fillRect/>
+          </a:stretch>
+        </p:blipFill>
+        <p:spPr>
+          <a:xfrm>
+            <a:off x="1" y="3503645"/>
+            <a:ext cx="4017810" cy="2837235"/>
+          </a:xfrm>
+          <a:prstGeom prst="rect">
+            <a:avLst/>
+          </a:prstGeom>
+        </p:spPr>
+      </p:pic>
+      <p:pic>
+        <p:nvPicPr>
+          <p:cNvPr id="11" name="Picture 10">
+            <a:extLst>
+              <a:ext uri="{FF2B5EF4-FFF2-40B4-BE49-F238E27FC236}">
+                <a16:creationId xmlns:a16="http://schemas.microsoft.com/office/drawing/2014/main" id="{826E5D8E-2015-4BD6-9424-DC3B989CA3E2}"/>
+              </a:ext>
+            </a:extLst>
+          </p:cNvPr>
+          <p:cNvPicPr>
+            <a:picLocks noChangeAspect="1"/>
+          </p:cNvPicPr>
+          <p:nvPr/>
+        </p:nvPicPr>
+        <p:blipFill>
+          <a:blip r:embed="rId6">
+            <a:extLst>
+              <a:ext uri="{28A0092B-C50C-407E-A947-70E740481C1C}">
+                <a14:useLocalDpi xmlns:a14="http://schemas.microsoft.com/office/drawing/2010/main" val="0"/>
+              </a:ext>
+            </a:extLst>
+          </a:blip>
+          <a:stretch>
+            <a:fillRect/>
+          </a:stretch>
+        </p:blipFill>
+        <p:spPr>
+          <a:xfrm>
+            <a:off x="4017810" y="3503645"/>
+            <a:ext cx="4156379" cy="2837235"/>
+          </a:xfrm>
+          <a:prstGeom prst="rect">
+            <a:avLst/>
+          </a:prstGeom>
+        </p:spPr>
+      </p:pic>
+      <p:pic>
+        <p:nvPicPr>
+          <p:cNvPr id="13" name="Picture 12">
+            <a:extLst>
+              <a:ext uri="{FF2B5EF4-FFF2-40B4-BE49-F238E27FC236}">
+                <a16:creationId xmlns:a16="http://schemas.microsoft.com/office/drawing/2014/main" id="{67B1E51D-F91E-4292-97E1-B72A5E38704B}"/>
+              </a:ext>
+            </a:extLst>
+          </p:cNvPr>
+          <p:cNvPicPr>
+            <a:picLocks noChangeAspect="1"/>
+          </p:cNvPicPr>
+          <p:nvPr/>
+        </p:nvPicPr>
+        <p:blipFill>
+          <a:blip r:embed="rId7">
+            <a:extLst>
+              <a:ext uri="{28A0092B-C50C-407E-A947-70E740481C1C}">
+                <a14:useLocalDpi xmlns:a14="http://schemas.microsoft.com/office/drawing/2010/main" val="0"/>
+              </a:ext>
+            </a:extLst>
+          </a:blip>
+          <a:stretch>
+            <a:fillRect/>
+          </a:stretch>
+        </p:blipFill>
+        <p:spPr>
+          <a:xfrm>
+            <a:off x="8035623" y="3784092"/>
+            <a:ext cx="4017810" cy="2556788"/>
+          </a:xfrm>
+          <a:prstGeom prst="rect">
+            <a:avLst/>
+          </a:prstGeom>
+        </p:spPr>
+      </p:pic>
+    </p:spTree>
+    <p:extLst>
+      <p:ext uri="{BB962C8B-B14F-4D97-AF65-F5344CB8AC3E}">
+        <p14:creationId xmlns:p14="http://schemas.microsoft.com/office/powerpoint/2010/main" val="210436311"/>
       </p:ext>
     </p:extLst>
   </p:cSld>
@@ -8618,6 +11377,301 @@
 </a:theme>
 </file>
 
+<file path=ppt/theme/theme2.xml><?xml version="1.0" encoding="utf-8"?>
+<a:theme xmlns:a="http://schemas.openxmlformats.org/drawingml/2006/main" name="Office Theme">
+  <a:themeElements>
+    <a:clrScheme name="Office">
+      <a:dk1>
+        <a:sysClr val="windowText" lastClr="000000"/>
+      </a:dk1>
+      <a:lt1>
+        <a:sysClr val="window" lastClr="FFFFFF"/>
+      </a:lt1>
+      <a:dk2>
+        <a:srgbClr val="44546A"/>
+      </a:dk2>
+      <a:lt2>
+        <a:srgbClr val="E7E6E6"/>
+      </a:lt2>
+      <a:accent1>
+        <a:srgbClr val="4472C4"/>
+      </a:accent1>
+      <a:accent2>
+        <a:srgbClr val="ED7D31"/>
+      </a:accent2>
+      <a:accent3>
+        <a:srgbClr val="A5A5A5"/>
+      </a:accent3>
+      <a:accent4>
+        <a:srgbClr val="FFC000"/>
+      </a:accent4>
+      <a:accent5>
+        <a:srgbClr val="5B9BD5"/>
+      </a:accent5>
+      <a:accent6>
+        <a:srgbClr val="70AD47"/>
+      </a:accent6>
+      <a:hlink>
+        <a:srgbClr val="0563C1"/>
+      </a:hlink>
+      <a:folHlink>
+        <a:srgbClr val="954F72"/>
+      </a:folHlink>
+    </a:clrScheme>
+    <a:fontScheme name="Office">
+      <a:majorFont>
+        <a:latin typeface="Calibri Light" panose="020F0302020204030204"/>
+        <a:ea typeface=""/>
+        <a:cs typeface=""/>
+        <a:font script="Jpan" typeface="游ゴシック Light"/>
+        <a:font script="Hang" typeface="맑은 고딕"/>
+        <a:font script="Hans" typeface="等线 Light"/>
+        <a:font script="Hant" typeface="新細明體"/>
+        <a:font script="Arab" typeface="Times New Roman"/>
+        <a:font script="Hebr" typeface="Times New Roman"/>
+        <a:font script="Thai" typeface="Angsana New"/>
+        <a:font script="Ethi" typeface="Nyala"/>
+        <a:font script="Beng" typeface="Vrinda"/>
+        <a:font script="Gujr" typeface="Shruti"/>
+        <a:font script="Khmr" typeface="MoolBoran"/>
+        <a:font script="Knda" typeface="Tunga"/>
+        <a:font script="Guru" typeface="Raavi"/>
+        <a:font script="Cans" typeface="Euphemia"/>
+        <a:font script="Cher" typeface="Plantagenet Cherokee"/>
+        <a:font script="Yiii" typeface="Microsoft Yi Baiti"/>
+        <a:font script="Tibt" typeface="Microsoft Himalaya"/>
+        <a:font script="Thaa" typeface="MV Boli"/>
+        <a:font script="Deva" typeface="Mangal"/>
+        <a:font script="Telu" typeface="Gautami"/>
+        <a:font script="Taml" typeface="Latha"/>
+        <a:font script="Syrc" typeface="Estrangelo Edessa"/>
+        <a:font script="Orya" typeface="Kalinga"/>
+        <a:font script="Mlym" typeface="Kartika"/>
+        <a:font script="Laoo" typeface="DokChampa"/>
+        <a:font script="Sinh" typeface="Iskoola Pota"/>
+        <a:font script="Mong" typeface="Mongolian Baiti"/>
+        <a:font script="Viet" typeface="Times New Roman"/>
+        <a:font script="Uigh" typeface="Microsoft Uighur"/>
+        <a:font script="Geor" typeface="Sylfaen"/>
+        <a:font script="Armn" typeface="Arial"/>
+        <a:font script="Bugi" typeface="Leelawadee UI"/>
+        <a:font script="Bopo" typeface="Microsoft JhengHei"/>
+        <a:font script="Java" typeface="Javanese Text"/>
+        <a:font script="Lisu" typeface="Segoe UI"/>
+        <a:font script="Mymr" typeface="Myanmar Text"/>
+        <a:font script="Nkoo" typeface="Ebrima"/>
+        <a:font script="Olck" typeface="Nirmala UI"/>
+        <a:font script="Osma" typeface="Ebrima"/>
+        <a:font script="Phag" typeface="Phagspa"/>
+        <a:font script="Syrn" typeface="Estrangelo Edessa"/>
+        <a:font script="Syrj" typeface="Estrangelo Edessa"/>
+        <a:font script="Syre" typeface="Estrangelo Edessa"/>
+        <a:font script="Sora" typeface="Nirmala UI"/>
+        <a:font script="Tale" typeface="Microsoft Tai Le"/>
+        <a:font script="Talu" typeface="Microsoft New Tai Lue"/>
+        <a:font script="Tfng" typeface="Ebrima"/>
+      </a:majorFont>
+      <a:minorFont>
+        <a:latin typeface="Calibri" panose="020F0502020204030204"/>
+        <a:ea typeface=""/>
+        <a:cs typeface=""/>
+        <a:font script="Jpan" typeface="游ゴシック"/>
+        <a:font script="Hang" typeface="맑은 고딕"/>
+        <a:font script="Hans" typeface="等线"/>
+        <a:font script="Hant" typeface="新細明體"/>
+        <a:font script="Arab" typeface="Arial"/>
+        <a:font script="Hebr" typeface="Arial"/>
+        <a:font script="Thai" typeface="Cordia New"/>
+        <a:font script="Ethi" typeface="Nyala"/>
+        <a:font script="Beng" typeface="Vrinda"/>
+        <a:font script="Gujr" typeface="Shruti"/>
+        <a:font script="Khmr" typeface="DaunPenh"/>
+        <a:font script="Knda" typeface="Tunga"/>
+        <a:font script="Guru" typeface="Raavi"/>
+        <a:font script="Cans" typeface="Euphemia"/>
+        <a:font script="Cher" typeface="Plantagenet Cherokee"/>
+        <a:font script="Yiii" typeface="Microsoft Yi Baiti"/>
+        <a:font script="Tibt" typeface="Microsoft Himalaya"/>
+        <a:font script="Thaa" typeface="MV Boli"/>
+        <a:font script="Deva" typeface="Mangal"/>
+        <a:font script="Telu" typeface="Gautami"/>
+        <a:font script="Taml" typeface="Latha"/>
+        <a:font script="Syrc" typeface="Estrangelo Edessa"/>
+        <a:font script="Orya" typeface="Kalinga"/>
+        <a:font script="Mlym" typeface="Kartika"/>
+        <a:font script="Laoo" typeface="DokChampa"/>
+        <a:font script="Sinh" typeface="Iskoola Pota"/>
+        <a:font script="Mong" typeface="Mongolian Baiti"/>
+        <a:font script="Viet" typeface="Arial"/>
+        <a:font script="Uigh" typeface="Microsoft Uighur"/>
+        <a:font script="Geor" typeface="Sylfaen"/>
+        <a:font script="Armn" typeface="Arial"/>
+        <a:font script="Bugi" typeface="Leelawadee UI"/>
+        <a:font script="Bopo" typeface="Microsoft JhengHei"/>
+        <a:font script="Java" typeface="Javanese Text"/>
+        <a:font script="Lisu" typeface="Segoe UI"/>
+        <a:font script="Mymr" typeface="Myanmar Text"/>
+        <a:font script="Nkoo" typeface="Ebrima"/>
+        <a:font script="Olck" typeface="Nirmala UI"/>
+        <a:font script="Osma" typeface="Ebrima"/>
+        <a:font script="Phag" typeface="Phagspa"/>
+        <a:font script="Syrn" typeface="Estrangelo Edessa"/>
+        <a:font script="Syrj" typeface="Estrangelo Edessa"/>
+        <a:font script="Syre" typeface="Estrangelo Edessa"/>
+        <a:font script="Sora" typeface="Nirmala UI"/>
+        <a:font script="Tale" typeface="Microsoft Tai Le"/>
+        <a:font script="Talu" typeface="Microsoft New Tai Lue"/>
+        <a:font script="Tfng" typeface="Ebrima"/>
+      </a:minorFont>
+    </a:fontScheme>
+    <a:fmtScheme name="Office">
+      <a:fillStyleLst>
+        <a:solidFill>
+          <a:schemeClr val="phClr"/>
+        </a:solidFill>
+        <a:gradFill rotWithShape="1">
+          <a:gsLst>
+            <a:gs pos="0">
+              <a:schemeClr val="phClr">
+                <a:lumMod val="110000"/>
+                <a:satMod val="105000"/>
+                <a:tint val="67000"/>
+              </a:schemeClr>
+            </a:gs>
+            <a:gs pos="50000">
+              <a:schemeClr val="phClr">
+                <a:lumMod val="105000"/>
+                <a:satMod val="103000"/>
+                <a:tint val="73000"/>
+              </a:schemeClr>
+            </a:gs>
+            <a:gs pos="100000">
+              <a:schemeClr val="phClr">
+                <a:lumMod val="105000"/>
+                <a:satMod val="109000"/>
+                <a:tint val="81000"/>
+              </a:schemeClr>
+            </a:gs>
+          </a:gsLst>
+          <a:lin ang="5400000" scaled="0"/>
+        </a:gradFill>
+        <a:gradFill rotWithShape="1">
+          <a:gsLst>
+            <a:gs pos="0">
+              <a:schemeClr val="phClr">
+                <a:satMod val="103000"/>
+                <a:lumMod val="102000"/>
+                <a:tint val="94000"/>
+              </a:schemeClr>
+            </a:gs>
+            <a:gs pos="50000">
+              <a:schemeClr val="phClr">
+                <a:satMod val="110000"/>
+                <a:lumMod val="100000"/>
+                <a:shade val="100000"/>
+              </a:schemeClr>
+            </a:gs>
+            <a:gs pos="100000">
+              <a:schemeClr val="phClr">
+                <a:lumMod val="99000"/>
+                <a:satMod val="120000"/>
+                <a:shade val="78000"/>
+              </a:schemeClr>
+            </a:gs>
+          </a:gsLst>
+          <a:lin ang="5400000" scaled="0"/>
+        </a:gradFill>
+      </a:fillStyleLst>
+      <a:lnStyleLst>
+        <a:ln w="6350" cap="flat" cmpd="sng" algn="ctr">
+          <a:solidFill>
+            <a:schemeClr val="phClr"/>
+          </a:solidFill>
+          <a:prstDash val="solid"/>
+          <a:miter lim="800000"/>
+        </a:ln>
+        <a:ln w="12700" cap="flat" cmpd="sng" algn="ctr">
+          <a:solidFill>
+            <a:schemeClr val="phClr"/>
+          </a:solidFill>
+          <a:prstDash val="solid"/>
+          <a:miter lim="800000"/>
+        </a:ln>
+        <a:ln w="19050" cap="flat" cmpd="sng" algn="ctr">
+          <a:solidFill>
+            <a:schemeClr val="phClr"/>
+          </a:solidFill>
+          <a:prstDash val="solid"/>
+          <a:miter lim="800000"/>
+        </a:ln>
+      </a:lnStyleLst>
+      <a:effectStyleLst>
+        <a:effectStyle>
+          <a:effectLst/>
+        </a:effectStyle>
+        <a:effectStyle>
+          <a:effectLst/>
+        </a:effectStyle>
+        <a:effectStyle>
+          <a:effectLst>
+            <a:outerShdw blurRad="57150" dist="19050" dir="5400000" algn="ctr" rotWithShape="0">
+              <a:srgbClr val="000000">
+                <a:alpha val="63000"/>
+              </a:srgbClr>
+            </a:outerShdw>
+          </a:effectLst>
+        </a:effectStyle>
+      </a:effectStyleLst>
+      <a:bgFillStyleLst>
+        <a:solidFill>
+          <a:schemeClr val="phClr"/>
+        </a:solidFill>
+        <a:solidFill>
+          <a:schemeClr val="phClr">
+            <a:tint val="95000"/>
+            <a:satMod val="170000"/>
+          </a:schemeClr>
+        </a:solidFill>
+        <a:gradFill rotWithShape="1">
+          <a:gsLst>
+            <a:gs pos="0">
+              <a:schemeClr val="phClr">
+                <a:tint val="93000"/>
+                <a:satMod val="150000"/>
+                <a:shade val="98000"/>
+                <a:lumMod val="102000"/>
+              </a:schemeClr>
+            </a:gs>
+            <a:gs pos="50000">
+              <a:schemeClr val="phClr">
+                <a:tint val="98000"/>
+                <a:satMod val="130000"/>
+                <a:shade val="90000"/>
+                <a:lumMod val="103000"/>
+              </a:schemeClr>
+            </a:gs>
+            <a:gs pos="100000">
+              <a:schemeClr val="phClr">
+                <a:shade val="63000"/>
+                <a:satMod val="120000"/>
+              </a:schemeClr>
+            </a:gs>
+          </a:gsLst>
+          <a:lin ang="5400000" scaled="0"/>
+        </a:gradFill>
+      </a:bgFillStyleLst>
+    </a:fmtScheme>
+  </a:themeElements>
+  <a:objectDefaults/>
+  <a:extraClrSchemeLst/>
+  <a:extLst>
+    <a:ext uri="{05A4C25C-085E-4340-85A3-A5531E510DB2}">
+      <thm15:themeFamily xmlns:thm15="http://schemas.microsoft.com/office/thememl/2012/main" name="Office Theme" id="{62F939B6-93AF-4DB8-9C6B-D6C7DFDC589F}" vid="{4A3C46E8-61CC-4603-A589-7422A47A8E4A}"/>
+    </a:ext>
+  </a:extLst>
+</a:theme>
+</file>
+
 <file path=ppt/theme/themeOverride1.xml><?xml version="1.0" encoding="utf-8"?>
 <a:themeOverride xmlns:a="http://schemas.openxmlformats.org/drawingml/2006/main">
   <a:clrScheme name="Retrospect">

</xml_diff>